<commit_message>
Analyse von Umfrage II
</commit_message>
<xml_diff>
--- a/documents/marketing/Marketing Analyse von Umfrage 2 (5.6).pptx
+++ b/documents/marketing/Marketing Analyse von Umfrage 2 (5.6).pptx
@@ -39,7 +39,7 @@
     <p:sldId id="341" r:id="rId30"/>
     <p:sldId id="335" r:id="rId31"/>
     <p:sldId id="319" r:id="rId32"/>
-    <p:sldId id="258" r:id="rId33"/>
+    <p:sldId id="342" r:id="rId33"/>
   </p:sldIdLst>
   <p:sldSz cx="9144000" cy="6858000" type="screen4x3"/>
   <p:notesSz cx="6858000" cy="9144000"/>
@@ -202,7 +202,7 @@
         <p14:section name="Erkenntnisse" id="{1F5D3F0E-2E10-417D-B3B3-F875A4E86560}">
           <p14:sldIdLst>
             <p14:sldId id="319"/>
-            <p14:sldId id="258"/>
+            <p14:sldId id="342"/>
           </p14:sldIdLst>
         </p14:section>
       </p14:sectionLst>
@@ -11791,7 +11791,7 @@
                 <a:latin typeface="Arial" panose="020B0604020202020204" pitchFamily="34" charset="0"/>
                 <a:cs typeface="Arial" panose="020B0604020202020204" pitchFamily="34" charset="0"/>
               </a:rPr>
-              <a:t>10 Teilnehmer haben verschiedene Vorschläge eingebracht.</a:t>
+              <a:t>10 Teilnehmer haben Vorschläge eingebracht.</a:t>
             </a:r>
           </a:p>
           <a:p>
@@ -19171,7 +19171,7 @@
           <a:p>
             <a:pPr marL="720725" indent="-274638"/>
             <a:r>
-              <a:rPr lang="de-DE" sz="1600" b="1" dirty="0" smtClean="0">
+              <a:rPr lang="de-DE" sz="1600" dirty="0" smtClean="0">
                 <a:latin typeface="Arial" panose="020B0604020202020204" pitchFamily="34" charset="0"/>
                 <a:cs typeface="Arial" panose="020B0604020202020204" pitchFamily="34" charset="0"/>
               </a:rPr>
@@ -20271,6 +20271,51 @@
           <a:lstStyle/>
           <a:p>
             <a:pPr marL="720725" indent="-274638"/>
+            <a:r>
+              <a:rPr lang="de-DE" sz="1600" dirty="0" smtClean="0">
+                <a:latin typeface="Arial" panose="020B0604020202020204" pitchFamily="34" charset="0"/>
+                <a:cs typeface="Arial" panose="020B0604020202020204" pitchFamily="34" charset="0"/>
+              </a:rPr>
+              <a:t>7 Teilnehmer haben dieses Freitextfeld genutzt um Verbesserungsvorschläge einzubringen.</a:t>
+            </a:r>
+          </a:p>
+          <a:p>
+            <a:pPr marL="720725" indent="-274638"/>
+            <a:r>
+              <a:rPr lang="de-DE" sz="1600" dirty="0" smtClean="0">
+                <a:latin typeface="Arial" panose="020B0604020202020204" pitchFamily="34" charset="0"/>
+                <a:cs typeface="Arial" panose="020B0604020202020204" pitchFamily="34" charset="0"/>
+              </a:rPr>
+              <a:t>Unter anderem wurde darauf hingewiesen, dass der </a:t>
+            </a:r>
+            <a:r>
+              <a:rPr lang="de-DE" sz="1600" b="1" dirty="0" smtClean="0">
+                <a:latin typeface="Arial" panose="020B0604020202020204" pitchFamily="34" charset="0"/>
+                <a:cs typeface="Arial" panose="020B0604020202020204" pitchFamily="34" charset="0"/>
+              </a:rPr>
+              <a:t>Text</a:t>
+            </a:r>
+            <a:r>
+              <a:rPr lang="de-DE" sz="1600" dirty="0" smtClean="0">
+                <a:latin typeface="Arial" panose="020B0604020202020204" pitchFamily="34" charset="0"/>
+                <a:cs typeface="Arial" panose="020B0604020202020204" pitchFamily="34" charset="0"/>
+              </a:rPr>
+              <a:t> auf dem </a:t>
+            </a:r>
+            <a:r>
+              <a:rPr lang="de-DE" sz="1600" b="1" dirty="0" smtClean="0">
+                <a:latin typeface="Arial" panose="020B0604020202020204" pitchFamily="34" charset="0"/>
+                <a:cs typeface="Arial" panose="020B0604020202020204" pitchFamily="34" charset="0"/>
+              </a:rPr>
+              <a:t>Bildhintergrund sehr schwer zu lesen </a:t>
+            </a:r>
+            <a:r>
+              <a:rPr lang="de-DE" sz="1600" dirty="0" smtClean="0">
+                <a:latin typeface="Arial" panose="020B0604020202020204" pitchFamily="34" charset="0"/>
+                <a:cs typeface="Arial" panose="020B0604020202020204" pitchFamily="34" charset="0"/>
+              </a:rPr>
+              <a:t>ist.</a:t>
+            </a:r>
             <a:endParaRPr lang="de-DE" sz="1600" dirty="0">
               <a:latin typeface="Arial" panose="020B0604020202020204" pitchFamily="34" charset="0"/>
               <a:cs typeface="Arial" panose="020B0604020202020204" pitchFamily="34" charset="0"/>
@@ -20690,14 +20735,14 @@
           <p:nvPr>
             <p:extLst>
               <p:ext uri="{D42A27DB-BD31-4B8C-83A1-F6EECF244321}">
-                <p14:modId xmlns:p14="http://schemas.microsoft.com/office/powerpoint/2010/main" val="3793618864"/>
+                <p14:modId xmlns:p14="http://schemas.microsoft.com/office/powerpoint/2010/main" val="2217129282"/>
               </p:ext>
             </p:extLst>
           </p:nvPr>
         </p:nvGraphicFramePr>
         <p:xfrm>
-          <a:off x="2123728" y="1838401"/>
-          <a:ext cx="4608512" cy="3168421"/>
+          <a:off x="2123728" y="2173448"/>
+          <a:ext cx="4608512" cy="2498328"/>
         </p:xfrm>
         <a:graphic>
           <a:graphicData uri="http://schemas.openxmlformats.org/drawingml/2006/table">
@@ -20919,30 +20964,16 @@
                           <a:latin typeface="Arial" panose="020B0604020202020204" pitchFamily="34" charset="0"/>
                           <a:cs typeface="Arial" panose="020B0604020202020204" pitchFamily="34" charset="0"/>
                         </a:rPr>
-                        <a:t> Entfernung hinzufügen</a:t>
+                        <a:t> Entfernung </a:t>
                       </a:r>
-                      <a:br>
-                        <a:rPr lang="de-DE" sz="900" u="none" strike="noStrike" dirty="0">
+                      <a:r>
+                        <a:rPr lang="de-DE" sz="900" u="none" strike="noStrike" dirty="0" smtClean="0">
                           <a:effectLst/>
                           <a:latin typeface="Arial" panose="020B0604020202020204" pitchFamily="34" charset="0"/>
                           <a:cs typeface="Arial" panose="020B0604020202020204" pitchFamily="34" charset="0"/>
                         </a:rPr>
-                      </a:br>
-                      <a:r>
-                        <a:rPr lang="de-DE" sz="900" u="none" strike="noStrike" dirty="0">
-                          <a:effectLst/>
-                          <a:latin typeface="Arial" panose="020B0604020202020204" pitchFamily="34" charset="0"/>
-                          <a:cs typeface="Arial" panose="020B0604020202020204" pitchFamily="34" charset="0"/>
-                        </a:rPr>
-                        <a:t/>
+                        <a:t>hinzufügen</a:t>
                       </a:r>
-                      <a:br>
-                        <a:rPr lang="de-DE" sz="900" u="none" strike="noStrike" dirty="0">
-                          <a:effectLst/>
-                          <a:latin typeface="Arial" panose="020B0604020202020204" pitchFamily="34" charset="0"/>
-                          <a:cs typeface="Arial" panose="020B0604020202020204" pitchFamily="34" charset="0"/>
-                        </a:rPr>
-                      </a:br>
                       <a:endParaRPr lang="de-DE" sz="900" b="0" i="0" u="none" strike="noStrike" dirty="0">
                         <a:solidFill>
                           <a:srgbClr val="000000"/>
@@ -20964,7 +20995,7 @@
                     <a:p>
                       <a:pPr algn="l" fontAlgn="b"/>
                       <a:r>
-                        <a:rPr lang="de-DE" sz="900" u="none" strike="noStrike">
+                        <a:rPr lang="de-DE" sz="900" u="none" strike="noStrike" dirty="0">
                           <a:effectLst/>
                           <a:latin typeface="Arial" panose="020B0604020202020204" pitchFamily="34" charset="0"/>
                           <a:cs typeface="Arial" panose="020B0604020202020204" pitchFamily="34" charset="0"/>
@@ -20972,14 +21003,46 @@
                         <a:t>Text scheint schwer lesbar über den Bildern, da aufpassen! </a:t>
                       </a:r>
                       <a:br>
-                        <a:rPr lang="de-DE" sz="900" u="none" strike="noStrike">
+                        <a:rPr lang="de-DE" sz="900" u="none" strike="noStrike" dirty="0">
                           <a:effectLst/>
                           <a:latin typeface="Arial" panose="020B0604020202020204" pitchFamily="34" charset="0"/>
                           <a:cs typeface="Arial" panose="020B0604020202020204" pitchFamily="34" charset="0"/>
                         </a:rPr>
                       </a:br>
                       <a:r>
-                        <a:rPr lang="de-DE" sz="900" u="none" strike="noStrike">
+                        <a:rPr lang="de-DE" sz="900" u="none" strike="noStrike" dirty="0">
+                          <a:effectLst/>
+                          <a:latin typeface="Arial" panose="020B0604020202020204" pitchFamily="34" charset="0"/>
+                          <a:cs typeface="Arial" panose="020B0604020202020204" pitchFamily="34" charset="0"/>
+                        </a:rPr>
+                        <a:t>Die drei Punkte im </a:t>
+                      </a:r>
+                      <a:r>
+                        <a:rPr lang="de-DE" sz="900" u="none" strike="noStrike" dirty="0" err="1">
+                          <a:effectLst/>
+                          <a:latin typeface="Arial" panose="020B0604020202020204" pitchFamily="34" charset="0"/>
+                          <a:cs typeface="Arial" panose="020B0604020202020204" pitchFamily="34" charset="0"/>
+                        </a:rPr>
+                        <a:t>subheader</a:t>
+                      </a:r>
+                      <a:r>
+                        <a:rPr lang="de-DE" sz="900" u="none" strike="noStrike" dirty="0">
+                          <a:effectLst/>
+                          <a:latin typeface="Arial" panose="020B0604020202020204" pitchFamily="34" charset="0"/>
+                          <a:cs typeface="Arial" panose="020B0604020202020204" pitchFamily="34" charset="0"/>
+                        </a:rPr>
+                        <a:t> sind nicht </a:t>
+                      </a:r>
+                      <a:r>
+                        <a:rPr lang="de-DE" sz="900" u="none" strike="noStrike" dirty="0" err="1" smtClean="0">
+                          <a:effectLst/>
+                          <a:latin typeface="Arial" panose="020B0604020202020204" pitchFamily="34" charset="0"/>
+                          <a:cs typeface="Arial" panose="020B0604020202020204" pitchFamily="34" charset="0"/>
+                        </a:rPr>
+                        <a:t>gkeichwertig</a:t>
+                      </a:r>
+                      <a:r>
+                        <a:rPr lang="de-DE" sz="900" u="none" strike="noStrike" dirty="0">
                           <a:effectLst/>
                           <a:latin typeface="Arial" panose="020B0604020202020204" pitchFamily="34" charset="0"/>
                           <a:cs typeface="Arial" panose="020B0604020202020204" pitchFamily="34" charset="0"/>
@@ -20987,44 +21050,14 @@
                         <a:t/>
                       </a:r>
                       <a:br>
-                        <a:rPr lang="de-DE" sz="900" u="none" strike="noStrike">
+                        <a:rPr lang="de-DE" sz="900" u="none" strike="noStrike" dirty="0">
                           <a:effectLst/>
                           <a:latin typeface="Arial" panose="020B0604020202020204" pitchFamily="34" charset="0"/>
                           <a:cs typeface="Arial" panose="020B0604020202020204" pitchFamily="34" charset="0"/>
                         </a:rPr>
                       </a:br>
                       <a:r>
-                        <a:rPr lang="de-DE" sz="900" u="none" strike="noStrike">
-                          <a:effectLst/>
-                          <a:latin typeface="Arial" panose="020B0604020202020204" pitchFamily="34" charset="0"/>
-                          <a:cs typeface="Arial" panose="020B0604020202020204" pitchFamily="34" charset="0"/>
-                        </a:rPr>
-                        <a:t>Die drei Punkte im subheader sind nicht gkeichwertig</a:t>
-                      </a:r>
-                      <a:br>
-                        <a:rPr lang="de-DE" sz="900" u="none" strike="noStrike">
-                          <a:effectLst/>
-                          <a:latin typeface="Arial" panose="020B0604020202020204" pitchFamily="34" charset="0"/>
-                          <a:cs typeface="Arial" panose="020B0604020202020204" pitchFamily="34" charset="0"/>
-                        </a:rPr>
-                      </a:br>
-                      <a:r>
-                        <a:rPr lang="de-DE" sz="900" u="none" strike="noStrike">
-                          <a:effectLst/>
-                          <a:latin typeface="Arial" panose="020B0604020202020204" pitchFamily="34" charset="0"/>
-                          <a:cs typeface="Arial" panose="020B0604020202020204" pitchFamily="34" charset="0"/>
-                        </a:rPr>
-                        <a:t/>
-                      </a:r>
-                      <a:br>
-                        <a:rPr lang="de-DE" sz="900" u="none" strike="noStrike">
-                          <a:effectLst/>
-                          <a:latin typeface="Arial" panose="020B0604020202020204" pitchFamily="34" charset="0"/>
-                          <a:cs typeface="Arial" panose="020B0604020202020204" pitchFamily="34" charset="0"/>
-                        </a:rPr>
-                      </a:br>
-                      <a:r>
-                        <a:rPr lang="de-DE" sz="900" u="none" strike="noStrike">
+                        <a:rPr lang="de-DE" sz="900" u="none" strike="noStrike" dirty="0">
                           <a:effectLst/>
                           <a:latin typeface="Arial" panose="020B0604020202020204" pitchFamily="34" charset="0"/>
                           <a:cs typeface="Arial" panose="020B0604020202020204" pitchFamily="34" charset="0"/>
@@ -21032,66 +21065,68 @@
                         <a:t>Was macht der Pin oben rechts? Führt er mich zu einer Liste von Routen in meiner Nähe? Mir ist die Funktion nicht klar. </a:t>
                       </a:r>
                       <a:br>
-                        <a:rPr lang="de-DE" sz="900" u="none" strike="noStrike">
+                        <a:rPr lang="de-DE" sz="900" u="none" strike="noStrike" dirty="0">
                           <a:effectLst/>
                           <a:latin typeface="Arial" panose="020B0604020202020204" pitchFamily="34" charset="0"/>
                           <a:cs typeface="Arial" panose="020B0604020202020204" pitchFamily="34" charset="0"/>
                         </a:rPr>
                       </a:br>
                       <a:r>
-                        <a:rPr lang="de-DE" sz="900" u="none" strike="noStrike">
+                        <a:rPr lang="de-DE" sz="900" u="none" strike="noStrike" dirty="0">
                           <a:effectLst/>
                           <a:latin typeface="Arial" panose="020B0604020202020204" pitchFamily="34" charset="0"/>
                           <a:cs typeface="Arial" panose="020B0604020202020204" pitchFamily="34" charset="0"/>
                         </a:rPr>
-                        <a:t/>
+                        <a:t>Hat </a:t>
+                      </a:r>
+                      <a:r>
+                        <a:rPr lang="de-DE" sz="900" u="none" strike="noStrike" dirty="0" err="1">
+                          <a:effectLst/>
+                          <a:latin typeface="Arial" panose="020B0604020202020204" pitchFamily="34" charset="0"/>
+                          <a:cs typeface="Arial" panose="020B0604020202020204" pitchFamily="34" charset="0"/>
+                        </a:rPr>
+                        <a:t>go</a:t>
+                      </a:r>
+                      <a:r>
+                        <a:rPr lang="de-DE" sz="900" u="none" strike="noStrike" dirty="0">
+                          <a:effectLst/>
+                          <a:latin typeface="Arial" panose="020B0604020202020204" pitchFamily="34" charset="0"/>
+                          <a:cs typeface="Arial" panose="020B0604020202020204" pitchFamily="34" charset="0"/>
+                        </a:rPr>
+                        <a:t> happy eine Farbe? Ein </a:t>
+                      </a:r>
+                      <a:r>
+                        <a:rPr lang="de-DE" sz="900" u="none" strike="noStrike" dirty="0" err="1">
+                          <a:effectLst/>
+                          <a:latin typeface="Arial" panose="020B0604020202020204" pitchFamily="34" charset="0"/>
+                          <a:cs typeface="Arial" panose="020B0604020202020204" pitchFamily="34" charset="0"/>
+                        </a:rPr>
+                        <a:t>corporate</a:t>
+                      </a:r>
+                      <a:r>
+                        <a:rPr lang="de-DE" sz="900" u="none" strike="noStrike" dirty="0">
+                          <a:effectLst/>
+                          <a:latin typeface="Arial" panose="020B0604020202020204" pitchFamily="34" charset="0"/>
+                          <a:cs typeface="Arial" panose="020B0604020202020204" pitchFamily="34" charset="0"/>
+                        </a:rPr>
+                        <a:t> Design? Grau und grau ist uncool. </a:t>
                       </a:r>
                       <a:br>
-                        <a:rPr lang="de-DE" sz="900" u="none" strike="noStrike">
+                        <a:rPr lang="de-DE" sz="900" u="none" strike="noStrike" dirty="0">
                           <a:effectLst/>
                           <a:latin typeface="Arial" panose="020B0604020202020204" pitchFamily="34" charset="0"/>
                           <a:cs typeface="Arial" panose="020B0604020202020204" pitchFamily="34" charset="0"/>
                         </a:rPr>
                       </a:br>
                       <a:r>
-                        <a:rPr lang="de-DE" sz="900" u="none" strike="noStrike">
-                          <a:effectLst/>
-                          <a:latin typeface="Arial" panose="020B0604020202020204" pitchFamily="34" charset="0"/>
-                          <a:cs typeface="Arial" panose="020B0604020202020204" pitchFamily="34" charset="0"/>
-                        </a:rPr>
-                        <a:t>Hat go happy eine Farbe? Ein corporate Design? Grau und grau ist uncool. </a:t>
-                      </a:r>
-                      <a:br>
-                        <a:rPr lang="de-DE" sz="900" u="none" strike="noStrike">
-                          <a:effectLst/>
-                          <a:latin typeface="Arial" panose="020B0604020202020204" pitchFamily="34" charset="0"/>
-                          <a:cs typeface="Arial" panose="020B0604020202020204" pitchFamily="34" charset="0"/>
-                        </a:rPr>
-                      </a:br>
-                      <a:r>
-                        <a:rPr lang="de-DE" sz="900" u="none" strike="noStrike">
-                          <a:effectLst/>
-                          <a:latin typeface="Arial" panose="020B0604020202020204" pitchFamily="34" charset="0"/>
-                          <a:cs typeface="Arial" panose="020B0604020202020204" pitchFamily="34" charset="0"/>
-                        </a:rPr>
-                        <a:t/>
-                      </a:r>
-                      <a:br>
-                        <a:rPr lang="de-DE" sz="900" u="none" strike="noStrike">
-                          <a:effectLst/>
-                          <a:latin typeface="Arial" panose="020B0604020202020204" pitchFamily="34" charset="0"/>
-                          <a:cs typeface="Arial" panose="020B0604020202020204" pitchFamily="34" charset="0"/>
-                        </a:rPr>
-                      </a:br>
-                      <a:r>
-                        <a:rPr lang="de-DE" sz="900" u="none" strike="noStrike">
+                        <a:rPr lang="de-DE" sz="900" u="none" strike="noStrike" dirty="0">
                           <a:effectLst/>
                           <a:latin typeface="Arial" panose="020B0604020202020204" pitchFamily="34" charset="0"/>
                           <a:cs typeface="Arial" panose="020B0604020202020204" pitchFamily="34" charset="0"/>
                         </a:rPr>
                         <a:t>(finde das Design an sich gut, wollte nur Feedback geben) </a:t>
                       </a:r>
-                      <a:endParaRPr lang="de-DE" sz="900" b="0" i="0" u="none" strike="noStrike">
+                      <a:endParaRPr lang="de-DE" sz="900" b="0" i="0" u="none" strike="noStrike" dirty="0">
                         <a:solidFill>
                           <a:srgbClr val="000000"/>
                         </a:solidFill>
@@ -21253,7 +21288,7 @@
           <a:p>
             <a:pPr marL="720725" indent="-274638"/>
             <a:r>
-              <a:rPr lang="de-DE" sz="1600" b="1" dirty="0">
+              <a:rPr lang="de-DE" sz="1600" dirty="0">
                 <a:latin typeface="Arial" panose="020B0604020202020204" pitchFamily="34" charset="0"/>
                 <a:cs typeface="Arial" panose="020B0604020202020204" pitchFamily="34" charset="0"/>
               </a:rPr>
@@ -22381,6 +22416,65 @@
           <a:lstStyle/>
           <a:p>
             <a:pPr marL="720725" indent="-274638"/>
+            <a:r>
+              <a:rPr lang="de-DE" sz="1600" dirty="0" smtClean="0">
+                <a:latin typeface="Arial" panose="020B0604020202020204" pitchFamily="34" charset="0"/>
+                <a:cs typeface="Arial" panose="020B0604020202020204" pitchFamily="34" charset="0"/>
+              </a:rPr>
+              <a:t>8 </a:t>
+            </a:r>
+            <a:r>
+              <a:rPr lang="de-DE" sz="1600" dirty="0">
+                <a:latin typeface="Arial" panose="020B0604020202020204" pitchFamily="34" charset="0"/>
+                <a:cs typeface="Arial" panose="020B0604020202020204" pitchFamily="34" charset="0"/>
+              </a:rPr>
+              <a:t>Teilnehmer haben dieses Freitextfeld genutzt um Verbesserungsvorschläge einzubringen.</a:t>
+            </a:r>
+          </a:p>
+          <a:p>
+            <a:pPr marL="720725" indent="-274638"/>
+            <a:r>
+              <a:rPr lang="de-DE" sz="1600" dirty="0">
+                <a:latin typeface="Arial" panose="020B0604020202020204" pitchFamily="34" charset="0"/>
+                <a:cs typeface="Arial" panose="020B0604020202020204" pitchFamily="34" charset="0"/>
+              </a:rPr>
+              <a:t>Unter anderem wurde darauf hingewiesen, dass </a:t>
+            </a:r>
+            <a:r>
+              <a:rPr lang="de-DE" sz="1600" b="1" dirty="0" smtClean="0">
+                <a:latin typeface="Arial" panose="020B0604020202020204" pitchFamily="34" charset="0"/>
+                <a:cs typeface="Arial" panose="020B0604020202020204" pitchFamily="34" charset="0"/>
+              </a:rPr>
+              <a:t>Einheiten</a:t>
+            </a:r>
+            <a:r>
+              <a:rPr lang="de-DE" sz="1600" dirty="0" smtClean="0">
+                <a:latin typeface="Arial" panose="020B0604020202020204" pitchFamily="34" charset="0"/>
+                <a:cs typeface="Arial" panose="020B0604020202020204" pitchFamily="34" charset="0"/>
+              </a:rPr>
+              <a:t> bei den Einstellungsmöglichkeiten </a:t>
+            </a:r>
+            <a:r>
+              <a:rPr lang="de-DE" sz="1600" b="1" dirty="0" smtClean="0">
+                <a:latin typeface="Arial" panose="020B0604020202020204" pitchFamily="34" charset="0"/>
+                <a:cs typeface="Arial" panose="020B0604020202020204" pitchFamily="34" charset="0"/>
+              </a:rPr>
+              <a:t>fehlen</a:t>
+            </a:r>
+            <a:r>
+              <a:rPr lang="de-DE" sz="1600" dirty="0" smtClean="0">
+                <a:latin typeface="Arial" panose="020B0604020202020204" pitchFamily="34" charset="0"/>
+                <a:cs typeface="Arial" panose="020B0604020202020204" pitchFamily="34" charset="0"/>
+              </a:rPr>
+              <a:t>.</a:t>
+            </a:r>
+            <a:endParaRPr lang="de-DE" sz="1600" dirty="0">
+              <a:latin typeface="Arial" panose="020B0604020202020204" pitchFamily="34" charset="0"/>
+              <a:cs typeface="Arial" panose="020B0604020202020204" pitchFamily="34" charset="0"/>
+            </a:endParaRPr>
+          </a:p>
+          <a:p>
+            <a:pPr marL="720725" indent="-274638"/>
             <a:endParaRPr lang="de-DE" sz="1600" dirty="0">
               <a:latin typeface="Arial" panose="020B0604020202020204" pitchFamily="34" charset="0"/>
               <a:cs typeface="Arial" panose="020B0604020202020204" pitchFamily="34" charset="0"/>
@@ -22807,14 +22901,14 @@
           <p:nvPr>
             <p:extLst>
               <p:ext uri="{D42A27DB-BD31-4B8C-83A1-F6EECF244321}">
-                <p14:modId xmlns:p14="http://schemas.microsoft.com/office/powerpoint/2010/main" val="76436451"/>
+                <p14:modId xmlns:p14="http://schemas.microsoft.com/office/powerpoint/2010/main" val="434249029"/>
               </p:ext>
             </p:extLst>
           </p:nvPr>
         </p:nvGraphicFramePr>
         <p:xfrm>
-          <a:off x="907594" y="1733466"/>
-          <a:ext cx="6768752" cy="3248904"/>
+          <a:off x="1331640" y="2060848"/>
+          <a:ext cx="6256694" cy="2629310"/>
         </p:xfrm>
         <a:graphic>
           <a:graphicData uri="http://schemas.openxmlformats.org/drawingml/2006/table">
@@ -22823,9 +22917,9 @@
                 <a:tableStyleId>{5C22544A-7EE6-4342-B048-85BDC9FD1C3A}</a:tableStyleId>
               </a:tblPr>
               <a:tblGrid>
-                <a:gridCol w="6768752"/>
+                <a:gridCol w="6256694"/>
               </a:tblGrid>
-              <a:tr h="351817">
+              <a:tr h="293242">
                 <a:tc>
                   <a:txBody>
                     <a:bodyPr/>
@@ -22848,27 +22942,20 @@
                         </a:rPr>
                       </a:br>
                       <a:r>
-                        <a:rPr lang="de-DE" sz="900" u="none" strike="noStrike" dirty="0">
+                        <a:rPr lang="de-DE" sz="900" u="none" strike="noStrike" dirty="0" smtClean="0">
                           <a:effectLst/>
                           <a:latin typeface="Arial" panose="020B0604020202020204" pitchFamily="34" charset="0"/>
                           <a:cs typeface="Arial" panose="020B0604020202020204" pitchFamily="34" charset="0"/>
                         </a:rPr>
-                        <a:t/>
+                        <a:t>Was </a:t>
                       </a:r>
-                      <a:br>
-                        <a:rPr lang="de-DE" sz="900" u="none" strike="noStrike" dirty="0">
-                          <a:effectLst/>
-                          <a:latin typeface="Arial" panose="020B0604020202020204" pitchFamily="34" charset="0"/>
-                          <a:cs typeface="Arial" panose="020B0604020202020204" pitchFamily="34" charset="0"/>
-                        </a:rPr>
-                      </a:br>
                       <a:r>
                         <a:rPr lang="de-DE" sz="900" u="none" strike="noStrike" dirty="0">
                           <a:effectLst/>
                           <a:latin typeface="Arial" panose="020B0604020202020204" pitchFamily="34" charset="0"/>
                           <a:cs typeface="Arial" panose="020B0604020202020204" pitchFamily="34" charset="0"/>
                         </a:rPr>
-                        <a:t>Was ist mit Ort/PLZ gemeint? Nur der Startpunkt, oder der Ort in welchem die Bars gesucht werden, ...</a:t>
+                        <a:t>ist mit Ort/PLZ gemeint? Nur der Startpunkt, oder der Ort in welchem die Bars gesucht werden, ...</a:t>
                       </a:r>
                       <a:endParaRPr lang="de-DE" sz="900" b="0" i="0" u="none" strike="noStrike" dirty="0">
                         <a:solidFill>
@@ -22883,7 +22970,7 @@
                   <a:tcPr marL="2407" marR="2407" marT="2407" marB="0" anchor="b"/>
                 </a:tc>
               </a:tr>
-              <a:tr h="584998">
+              <a:tr h="487599">
                 <a:tc>
                   <a:txBody>
                     <a:bodyPr/>
@@ -22906,27 +22993,20 @@
                         </a:rPr>
                       </a:br>
                       <a:r>
-                        <a:rPr lang="de-DE" sz="900" u="none" strike="noStrike" dirty="0">
+                        <a:rPr lang="de-DE" sz="900" u="none" strike="noStrike" dirty="0" smtClean="0">
                           <a:effectLst/>
                           <a:latin typeface="Arial" panose="020B0604020202020204" pitchFamily="34" charset="0"/>
                           <a:cs typeface="Arial" panose="020B0604020202020204" pitchFamily="34" charset="0"/>
                         </a:rPr>
-                        <a:t/>
+                        <a:t>-</a:t>
                       </a:r>
-                      <a:br>
-                        <a:rPr lang="de-DE" sz="900" u="none" strike="noStrike" dirty="0">
-                          <a:effectLst/>
-                          <a:latin typeface="Arial" panose="020B0604020202020204" pitchFamily="34" charset="0"/>
-                          <a:cs typeface="Arial" panose="020B0604020202020204" pitchFamily="34" charset="0"/>
-                        </a:rPr>
-                      </a:br>
                       <a:r>
                         <a:rPr lang="de-DE" sz="900" u="none" strike="noStrike" dirty="0">
                           <a:effectLst/>
                           <a:latin typeface="Arial" panose="020B0604020202020204" pitchFamily="34" charset="0"/>
                           <a:cs typeface="Arial" panose="020B0604020202020204" pitchFamily="34" charset="0"/>
                         </a:rPr>
-                        <a:t>-Autovervollständigung bei Ort mit automatischer Erkennung/</a:t>
+                        <a:t>Autovervollständigung bei Ort mit automatischer Erkennung/</a:t>
                       </a:r>
                       <a:r>
                         <a:rPr lang="de-DE" sz="900" u="none" strike="noStrike" dirty="0" err="1">
@@ -22952,27 +23032,20 @@
                         </a:rPr>
                       </a:br>
                       <a:r>
-                        <a:rPr lang="de-DE" sz="900" u="none" strike="noStrike" dirty="0">
+                        <a:rPr lang="de-DE" sz="900" u="none" strike="noStrike" dirty="0" smtClean="0">
                           <a:effectLst/>
                           <a:latin typeface="Arial" panose="020B0604020202020204" pitchFamily="34" charset="0"/>
                           <a:cs typeface="Arial" panose="020B0604020202020204" pitchFamily="34" charset="0"/>
                         </a:rPr>
-                        <a:t/>
+                        <a:t>-</a:t>
                       </a:r>
-                      <a:br>
-                        <a:rPr lang="de-DE" sz="900" u="none" strike="noStrike" dirty="0">
-                          <a:effectLst/>
-                          <a:latin typeface="Arial" panose="020B0604020202020204" pitchFamily="34" charset="0"/>
-                          <a:cs typeface="Arial" panose="020B0604020202020204" pitchFamily="34" charset="0"/>
-                        </a:rPr>
-                      </a:br>
                       <a:r>
                         <a:rPr lang="de-DE" sz="900" u="none" strike="noStrike" dirty="0">
                           <a:effectLst/>
                           <a:latin typeface="Arial" panose="020B0604020202020204" pitchFamily="34" charset="0"/>
                           <a:cs typeface="Arial" panose="020B0604020202020204" pitchFamily="34" charset="0"/>
                         </a:rPr>
-                        <a:t>-Heute, Morgen, weitere Daten als Auswahl bei Tag</a:t>
+                        <a:t>Heute, Morgen, weitere Daten als Auswahl bei Tag</a:t>
                       </a:r>
                       <a:endParaRPr lang="de-DE" sz="900" b="0" i="0" u="none" strike="noStrike" dirty="0">
                         <a:solidFill>
@@ -22987,7 +23060,7 @@
                   <a:tcPr marL="2407" marR="2407" marT="2407" marB="0" anchor="b"/>
                 </a:tc>
               </a:tr>
-              <a:tr h="118636">
+              <a:tr h="116330">
                 <a:tc>
                   <a:txBody>
                     <a:bodyPr/>
@@ -23015,7 +23088,7 @@
                   <a:tcPr marL="2407" marR="2407" marT="2407" marB="0" anchor="b"/>
                 </a:tc>
               </a:tr>
-              <a:tr h="118636">
+              <a:tr h="116330">
                 <a:tc>
                   <a:txBody>
                     <a:bodyPr/>
@@ -23043,7 +23116,7 @@
                   <a:tcPr marL="2407" marR="2407" marT="2407" marB="0" anchor="b"/>
                 </a:tc>
               </a:tr>
-              <a:tr h="351695">
+              <a:tr h="293140">
                 <a:tc>
                   <a:txBody>
                     <a:bodyPr/>
@@ -23087,7 +23160,7 @@
                   <a:tcPr marL="2407" marR="2407" marT="2407" marB="0" anchor="b"/>
                 </a:tc>
               </a:tr>
-              <a:tr h="1051359">
+              <a:tr h="876314">
                 <a:tc>
                   <a:txBody>
                     <a:bodyPr/>
@@ -23126,12 +23199,20 @@
                         </a:rPr>
                       </a:br>
                       <a:r>
+                        <a:rPr lang="de-DE" sz="900" u="none" strike="noStrike" dirty="0" smtClean="0">
+                          <a:effectLst/>
+                          <a:latin typeface="Arial" panose="020B0604020202020204" pitchFamily="34" charset="0"/>
+                          <a:cs typeface="Arial" panose="020B0604020202020204" pitchFamily="34" charset="0"/>
+                        </a:rPr>
+                        <a:t>Das </a:t>
+                      </a:r>
+                      <a:r>
                         <a:rPr lang="de-DE" sz="900" u="none" strike="noStrike" dirty="0">
                           <a:effectLst/>
                           <a:latin typeface="Arial" panose="020B0604020202020204" pitchFamily="34" charset="0"/>
                           <a:cs typeface="Arial" panose="020B0604020202020204" pitchFamily="34" charset="0"/>
                         </a:rPr>
-                        <a:t/>
+                        <a:t>wäre für den Nutzer viel intuitiver. </a:t>
                       </a:r>
                       <a:br>
                         <a:rPr lang="de-DE" sz="900" u="none" strike="noStrike" dirty="0">
@@ -23141,12 +23222,43 @@
                         </a:rPr>
                       </a:br>
                       <a:r>
+                        <a:rPr lang="de-DE" sz="900" u="none" strike="noStrike" dirty="0" smtClean="0">
+                          <a:effectLst/>
+                          <a:latin typeface="Arial" panose="020B0604020202020204" pitchFamily="34" charset="0"/>
+                          <a:cs typeface="Arial" panose="020B0604020202020204" pitchFamily="34" charset="0"/>
+                        </a:rPr>
+                        <a:t>Es </a:t>
+                      </a:r>
+                      <a:r>
                         <a:rPr lang="de-DE" sz="900" u="none" strike="noStrike" dirty="0">
                           <a:effectLst/>
                           <a:latin typeface="Arial" panose="020B0604020202020204" pitchFamily="34" charset="0"/>
                           <a:cs typeface="Arial" panose="020B0604020202020204" pitchFamily="34" charset="0"/>
                         </a:rPr>
-                        <a:t>Das wäre für den Nutzer viel intuitiver. </a:t>
+                        <a:t>fehlen Einheiten. </a:t>
+                      </a:r>
+                      <a:br>
+                        <a:rPr lang="de-DE" sz="900" u="none" strike="noStrike" dirty="0">
+                          <a:effectLst/>
+                          <a:latin typeface="Arial" panose="020B0604020202020204" pitchFamily="34" charset="0"/>
+                          <a:cs typeface="Arial" panose="020B0604020202020204" pitchFamily="34" charset="0"/>
+                        </a:rPr>
+                      </a:br>
+                      <a:r>
+                        <a:rPr lang="de-DE" sz="900" u="none" strike="noStrike" dirty="0" smtClean="0">
+                          <a:effectLst/>
+                          <a:latin typeface="Arial" panose="020B0604020202020204" pitchFamily="34" charset="0"/>
+                          <a:cs typeface="Arial" panose="020B0604020202020204" pitchFamily="34" charset="0"/>
+                        </a:rPr>
+                        <a:t>Das </a:t>
+                      </a:r>
+                      <a:r>
+                        <a:rPr lang="de-DE" sz="900" u="none" strike="noStrike" dirty="0">
+                          <a:effectLst/>
+                          <a:latin typeface="Arial" panose="020B0604020202020204" pitchFamily="34" charset="0"/>
+                          <a:cs typeface="Arial" panose="020B0604020202020204" pitchFamily="34" charset="0"/>
+                        </a:rPr>
+                        <a:t>Design ist nicht stimmig zur anderen Seite. Der dunkle Ton gefällt mir aber besser. </a:t>
                       </a:r>
                       <a:br>
                         <a:rPr lang="de-DE" sz="900" u="none" strike="noStrike" dirty="0">
@@ -23171,72 +23283,28 @@
                         </a:rPr>
                       </a:br>
                       <a:r>
-                        <a:rPr lang="de-DE" sz="900" u="none" strike="noStrike" dirty="0">
+                        <a:rPr lang="de-DE" sz="900" u="none" strike="noStrike" dirty="0" err="1" smtClean="0">
                           <a:effectLst/>
                           <a:latin typeface="Arial" panose="020B0604020202020204" pitchFamily="34" charset="0"/>
                           <a:cs typeface="Arial" panose="020B0604020202020204" pitchFamily="34" charset="0"/>
                         </a:rPr>
-                        <a:t>Es fehlen Einheiten. </a:t>
+                        <a:t>Kannich</a:t>
                       </a:r>
-                      <a:br>
-                        <a:rPr lang="de-DE" sz="900" u="none" strike="noStrike" dirty="0">
+                      <a:r>
+                        <a:rPr lang="de-DE" sz="900" u="none" strike="noStrike" dirty="0" smtClean="0">
                           <a:effectLst/>
                           <a:latin typeface="Arial" panose="020B0604020202020204" pitchFamily="34" charset="0"/>
                           <a:cs typeface="Arial" panose="020B0604020202020204" pitchFamily="34" charset="0"/>
                         </a:rPr>
-                      </a:br>
+                        <a:t> </a:t>
+                      </a:r>
                       <a:r>
                         <a:rPr lang="de-DE" sz="900" u="none" strike="noStrike" dirty="0">
                           <a:effectLst/>
                           <a:latin typeface="Arial" panose="020B0604020202020204" pitchFamily="34" charset="0"/>
                           <a:cs typeface="Arial" panose="020B0604020202020204" pitchFamily="34" charset="0"/>
                         </a:rPr>
-                        <a:t/>
-                      </a:r>
-                      <a:br>
-                        <a:rPr lang="de-DE" sz="900" u="none" strike="noStrike" dirty="0">
-                          <a:effectLst/>
-                          <a:latin typeface="Arial" panose="020B0604020202020204" pitchFamily="34" charset="0"/>
-                          <a:cs typeface="Arial" panose="020B0604020202020204" pitchFamily="34" charset="0"/>
-                        </a:rPr>
-                      </a:br>
-                      <a:r>
-                        <a:rPr lang="de-DE" sz="900" u="none" strike="noStrike" dirty="0">
-                          <a:effectLst/>
-                          <a:latin typeface="Arial" panose="020B0604020202020204" pitchFamily="34" charset="0"/>
-                          <a:cs typeface="Arial" panose="020B0604020202020204" pitchFamily="34" charset="0"/>
-                        </a:rPr>
-                        <a:t>Das Design ist nicht stimmig zur anderen Seite. Der dunkle Ton gefällt mir aber besser. </a:t>
-                      </a:r>
-                      <a:br>
-                        <a:rPr lang="de-DE" sz="900" u="none" strike="noStrike" dirty="0">
-                          <a:effectLst/>
-                          <a:latin typeface="Arial" panose="020B0604020202020204" pitchFamily="34" charset="0"/>
-                          <a:cs typeface="Arial" panose="020B0604020202020204" pitchFamily="34" charset="0"/>
-                        </a:rPr>
-                      </a:br>
-                      <a:r>
-                        <a:rPr lang="de-DE" sz="900" u="none" strike="noStrike" dirty="0">
-                          <a:effectLst/>
-                          <a:latin typeface="Arial" panose="020B0604020202020204" pitchFamily="34" charset="0"/>
-                          <a:cs typeface="Arial" panose="020B0604020202020204" pitchFamily="34" charset="0"/>
-                        </a:rPr>
-                        <a:t/>
-                      </a:r>
-                      <a:br>
-                        <a:rPr lang="de-DE" sz="900" u="none" strike="noStrike" dirty="0">
-                          <a:effectLst/>
-                          <a:latin typeface="Arial" panose="020B0604020202020204" pitchFamily="34" charset="0"/>
-                          <a:cs typeface="Arial" panose="020B0604020202020204" pitchFamily="34" charset="0"/>
-                        </a:rPr>
-                      </a:br>
-                      <a:r>
-                        <a:rPr lang="de-DE" sz="900" u="none" strike="noStrike" dirty="0">
-                          <a:effectLst/>
-                          <a:latin typeface="Arial" panose="020B0604020202020204" pitchFamily="34" charset="0"/>
-                          <a:cs typeface="Arial" panose="020B0604020202020204" pitchFamily="34" charset="0"/>
-                        </a:rPr>
-                        <a:t>Kann ich bei "tag" keine </a:t>
+                        <a:t>bei "tag" keine </a:t>
                       </a:r>
                       <a:r>
                         <a:rPr lang="de-DE" sz="900" u="none" strike="noStrike" dirty="0" err="1">
@@ -23267,7 +23335,7 @@
                   <a:tcPr marL="2407" marR="2407" marT="2407" marB="0" anchor="b"/>
                 </a:tc>
               </a:tr>
-              <a:tr h="118636">
+              <a:tr h="116330">
                 <a:tc>
                   <a:txBody>
                     <a:bodyPr/>
@@ -23295,7 +23363,7 @@
                   <a:tcPr marL="2407" marR="2407" marT="2407" marB="0" anchor="b"/>
                 </a:tc>
               </a:tr>
-              <a:tr h="118636">
+              <a:tr h="116330">
                 <a:tc>
                   <a:txBody>
                     <a:bodyPr/>
@@ -23450,6 +23518,27 @@
           <a:lstStyle/>
           <a:p>
             <a:pPr marL="720725" indent="-274638"/>
+            <a:r>
+              <a:rPr lang="de-DE" sz="1600" dirty="0" smtClean="0">
+                <a:latin typeface="Arial" panose="020B0604020202020204" pitchFamily="34" charset="0"/>
+                <a:cs typeface="Arial" panose="020B0604020202020204" pitchFamily="34" charset="0"/>
+              </a:rPr>
+              <a:t>18 </a:t>
+            </a:r>
+            <a:r>
+              <a:rPr lang="de-DE" sz="1600" dirty="0">
+                <a:latin typeface="Arial" panose="020B0604020202020204" pitchFamily="34" charset="0"/>
+                <a:cs typeface="Arial" panose="020B0604020202020204" pitchFamily="34" charset="0"/>
+              </a:rPr>
+              <a:t>Teilnehmer haben dieses Freitextfeld genutzt um Verbesserungsvorschläge einzubringen</a:t>
+            </a:r>
+            <a:r>
+              <a:rPr lang="de-DE" sz="1600" dirty="0" smtClean="0">
+                <a:latin typeface="Arial" panose="020B0604020202020204" pitchFamily="34" charset="0"/>
+                <a:cs typeface="Arial" panose="020B0604020202020204" pitchFamily="34" charset="0"/>
+              </a:rPr>
+              <a:t>.</a:t>
+            </a:r>
             <a:endParaRPr lang="de-DE" sz="1600" dirty="0">
               <a:latin typeface="Arial" panose="020B0604020202020204" pitchFamily="34" charset="0"/>
               <a:cs typeface="Arial" panose="020B0604020202020204" pitchFamily="34" charset="0"/>
@@ -24838,7 +24927,27 @@
                 <a:latin typeface="Arial" panose="020B0604020202020204" pitchFamily="34" charset="0"/>
                 <a:cs typeface="Arial" panose="020B0604020202020204" pitchFamily="34" charset="0"/>
               </a:rPr>
-              <a:t>Bei der Analyse der Umfrage werden zum einen die Basic </a:t>
+              <a:t>Bei der Analyse der Umfrage werden </a:t>
+            </a:r>
+            <a:r>
+              <a:rPr lang="de-DE" sz="1600" dirty="0" smtClean="0">
+                <a:solidFill>
+                  <a:schemeClr val="bg1"/>
+                </a:solidFill>
+                <a:latin typeface="Arial" panose="020B0604020202020204" pitchFamily="34" charset="0"/>
+                <a:cs typeface="Arial" panose="020B0604020202020204" pitchFamily="34" charset="0"/>
+              </a:rPr>
+              <a:t>die </a:t>
+            </a:r>
+            <a:r>
+              <a:rPr lang="de-DE" sz="1600" dirty="0">
+                <a:solidFill>
+                  <a:schemeClr val="bg1"/>
+                </a:solidFill>
+                <a:latin typeface="Arial" panose="020B0604020202020204" pitchFamily="34" charset="0"/>
+                <a:cs typeface="Arial" panose="020B0604020202020204" pitchFamily="34" charset="0"/>
+              </a:rPr>
+              <a:t>Basic </a:t>
             </a:r>
             <a:r>
               <a:rPr lang="de-DE" sz="1600" dirty="0" err="1" smtClean="0">
@@ -24861,44 +24970,24 @@
               <a:t> </a:t>
             </a:r>
             <a:r>
-              <a:rPr lang="de-DE" sz="1600" dirty="0">
+              <a:rPr lang="de-DE" sz="1600" dirty="0" smtClean="0">
                 <a:solidFill>
                   <a:schemeClr val="bg1"/>
                 </a:solidFill>
                 <a:latin typeface="Arial" panose="020B0604020202020204" pitchFamily="34" charset="0"/>
                 <a:cs typeface="Arial" panose="020B0604020202020204" pitchFamily="34" charset="0"/>
               </a:rPr>
-              <a:t>aber auch verschiedenen </a:t>
-            </a:r>
-            <a:r>
-              <a:rPr lang="de-DE" sz="1600" dirty="0" err="1">
+              <a:t>der </a:t>
+            </a:r>
+            <a:r>
+              <a:rPr lang="de-DE" sz="1600" dirty="0" smtClean="0">
                 <a:solidFill>
                   <a:schemeClr val="bg1"/>
                 </a:solidFill>
                 <a:latin typeface="Arial" panose="020B0604020202020204" pitchFamily="34" charset="0"/>
                 <a:cs typeface="Arial" panose="020B0604020202020204" pitchFamily="34" charset="0"/>
               </a:rPr>
-              <a:t>Crosstabs</a:t>
-            </a:r>
-            <a:r>
-              <a:rPr lang="de-DE" sz="1600" dirty="0">
-                <a:solidFill>
-                  <a:schemeClr val="bg1"/>
-                </a:solidFill>
-                <a:latin typeface="Arial" panose="020B0604020202020204" pitchFamily="34" charset="0"/>
-                <a:cs typeface="Arial" panose="020B0604020202020204" pitchFamily="34" charset="0"/>
-              </a:rPr>
-              <a:t> </a:t>
-            </a:r>
-            <a:r>
-              <a:rPr lang="de-DE" sz="1600" dirty="0" smtClean="0">
-                <a:solidFill>
-                  <a:schemeClr val="bg1"/>
-                </a:solidFill>
-                <a:latin typeface="Arial" panose="020B0604020202020204" pitchFamily="34" charset="0"/>
-                <a:cs typeface="Arial" panose="020B0604020202020204" pitchFamily="34" charset="0"/>
-              </a:rPr>
-              <a:t>der Fragen betrachtet. Die Analyse wurde mit Hilfe von Microsoft Excel 2010 und SPSS 20 durchgeführt.</a:t>
+              <a:t>Fragen betrachtet. Die Analyse wurde mit Hilfe von Microsoft Excel 2010 und SPSS 20 durchgeführt.</a:t>
             </a:r>
             <a:endParaRPr lang="de-DE" sz="1600" dirty="0">
               <a:latin typeface="Arial" panose="020B0604020202020204" pitchFamily="34" charset="0"/>
@@ -25159,6 +25248,16 @@
             <a:normAutofit/>
           </a:bodyPr>
           <a:lstStyle/>
+          <a:p>
+            <a:pPr marL="720725" indent="-274638"/>
+            <a:r>
+              <a:rPr lang="de-DE" sz="1600" dirty="0">
+                <a:latin typeface="Arial" panose="020B0604020202020204" pitchFamily="34" charset="0"/>
+                <a:cs typeface="Arial" panose="020B0604020202020204" pitchFamily="34" charset="0"/>
+              </a:rPr>
+              <a:t>18 Teilnehmer haben dieses Freitextfeld genutzt um Verbesserungsvorschläge einzubringen.</a:t>
+            </a:r>
+          </a:p>
           <a:p>
             <a:pPr marL="720725" indent="-274638"/>
             <a:endParaRPr lang="de-DE" sz="1600" dirty="0">
@@ -26245,7 +26344,7 @@
         </p:spPr>
         <p:txBody>
           <a:bodyPr>
-            <a:normAutofit/>
+            <a:normAutofit lnSpcReduction="10000"/>
           </a:bodyPr>
           <a:lstStyle/>
           <a:p>
@@ -26260,8 +26359,379 @@
                 <a:latin typeface="Arial" panose="020B0604020202020204" pitchFamily="34" charset="0"/>
                 <a:cs typeface="Arial" panose="020B0604020202020204" pitchFamily="34" charset="0"/>
               </a:rPr>
-              <a:t>???</a:t>
-            </a:r>
+              <a:t>Auf Grund der Priorisierung der Informationen (</a:t>
+            </a:r>
+            <a:r>
+              <a:rPr lang="de-DE" sz="1600" dirty="0">
+                <a:latin typeface="Arial" panose="020B0604020202020204" pitchFamily="34" charset="0"/>
+                <a:cs typeface="Arial" panose="020B0604020202020204" pitchFamily="34" charset="0"/>
+              </a:rPr>
+              <a:t>Happy Hour Zeiten, Preisindizes, Adressen, Arten, Kundenbewertungen, </a:t>
+            </a:r>
+            <a:r>
+              <a:rPr lang="de-DE" sz="1600" dirty="0" smtClean="0">
+                <a:latin typeface="Arial" panose="020B0604020202020204" pitchFamily="34" charset="0"/>
+                <a:cs typeface="Arial" panose="020B0604020202020204" pitchFamily="34" charset="0"/>
+              </a:rPr>
+              <a:t>Öffnungszeiten) kann festgestellt werden, welche Informationen am schnellsten für den Nutzer einsehbar sein müssen. (</a:t>
+            </a:r>
+            <a:r>
+              <a:rPr lang="de-DE" sz="1600" dirty="0" smtClean="0">
+                <a:latin typeface="Arial" panose="020B0604020202020204" pitchFamily="34" charset="0"/>
+                <a:cs typeface="Arial" panose="020B0604020202020204" pitchFamily="34" charset="0"/>
+                <a:hlinkClick r:id="rId2" action="ppaction://hlinksldjump"/>
+              </a:rPr>
+              <a:t>Folie 10</a:t>
+            </a:r>
+            <a:r>
+              <a:rPr lang="de-DE" sz="1600" dirty="0" smtClean="0">
+                <a:latin typeface="Arial" panose="020B0604020202020204" pitchFamily="34" charset="0"/>
+                <a:cs typeface="Arial" panose="020B0604020202020204" pitchFamily="34" charset="0"/>
+              </a:rPr>
+              <a:t>)</a:t>
+            </a:r>
+          </a:p>
+          <a:p>
+            <a:pPr>
+              <a:spcBef>
+                <a:spcPts val="0"/>
+              </a:spcBef>
+              <a:defRPr/>
+            </a:pPr>
+            <a:r>
+              <a:rPr lang="de-DE" sz="1600" dirty="0" smtClean="0">
+                <a:latin typeface="Arial" panose="020B0604020202020204" pitchFamily="34" charset="0"/>
+                <a:cs typeface="Arial" panose="020B0604020202020204" pitchFamily="34" charset="0"/>
+              </a:rPr>
+              <a:t>Start Ort bzw. </a:t>
+            </a:r>
+            <a:r>
+              <a:rPr lang="de-DE" sz="1600" dirty="0" err="1" smtClean="0">
+                <a:latin typeface="Arial" panose="020B0604020202020204" pitchFamily="34" charset="0"/>
+                <a:cs typeface="Arial" panose="020B0604020202020204" pitchFamily="34" charset="0"/>
+              </a:rPr>
+              <a:t>Plz</a:t>
+            </a:r>
+            <a:r>
+              <a:rPr lang="de-DE" sz="1600" dirty="0" smtClean="0">
+                <a:latin typeface="Arial" panose="020B0604020202020204" pitchFamily="34" charset="0"/>
+                <a:cs typeface="Arial" panose="020B0604020202020204" pitchFamily="34" charset="0"/>
+              </a:rPr>
+              <a:t>, Radius zu weiteren Locations, Startuhrzeit und Tag werden von den Teilnehmern tendenziell als wichtig bis sehr wichtig eingeschätzt. (</a:t>
+            </a:r>
+            <a:r>
+              <a:rPr lang="de-DE" sz="1600" dirty="0" smtClean="0">
+                <a:latin typeface="Arial" panose="020B0604020202020204" pitchFamily="34" charset="0"/>
+                <a:cs typeface="Arial" panose="020B0604020202020204" pitchFamily="34" charset="0"/>
+                <a:hlinkClick r:id="rId3" action="ppaction://hlinksldjump"/>
+              </a:rPr>
+              <a:t>Folie 11</a:t>
+            </a:r>
+            <a:r>
+              <a:rPr lang="de-DE" sz="1600" dirty="0">
+                <a:latin typeface="Arial" panose="020B0604020202020204" pitchFamily="34" charset="0"/>
+                <a:cs typeface="Arial" panose="020B0604020202020204" pitchFamily="34" charset="0"/>
+                <a:hlinkClick r:id="rId3" action="ppaction://hlinksldjump"/>
+              </a:rPr>
+              <a:t> </a:t>
+            </a:r>
+            <a:r>
+              <a:rPr lang="de-DE" sz="1600" dirty="0" smtClean="0">
+                <a:latin typeface="Arial" panose="020B0604020202020204" pitchFamily="34" charset="0"/>
+                <a:cs typeface="Arial" panose="020B0604020202020204" pitchFamily="34" charset="0"/>
+              </a:rPr>
+              <a:t>&amp; </a:t>
+            </a:r>
+            <a:r>
+              <a:rPr lang="de-DE" sz="1600" dirty="0" smtClean="0">
+                <a:latin typeface="Arial" panose="020B0604020202020204" pitchFamily="34" charset="0"/>
+                <a:cs typeface="Arial" panose="020B0604020202020204" pitchFamily="34" charset="0"/>
+                <a:hlinkClick r:id="rId4" action="ppaction://hlinksldjump"/>
+              </a:rPr>
+              <a:t>Folie 12</a:t>
+            </a:r>
+            <a:r>
+              <a:rPr lang="de-DE" sz="1600" dirty="0" smtClean="0">
+                <a:latin typeface="Arial" panose="020B0604020202020204" pitchFamily="34" charset="0"/>
+                <a:cs typeface="Arial" panose="020B0604020202020204" pitchFamily="34" charset="0"/>
+              </a:rPr>
+              <a:t>)</a:t>
+            </a:r>
+          </a:p>
+          <a:p>
+            <a:pPr>
+              <a:spcBef>
+                <a:spcPts val="0"/>
+              </a:spcBef>
+              <a:defRPr/>
+            </a:pPr>
+            <a:r>
+              <a:rPr lang="de-DE" sz="1600" dirty="0" smtClean="0">
+                <a:latin typeface="Arial" panose="020B0604020202020204" pitchFamily="34" charset="0"/>
+                <a:cs typeface="Arial" panose="020B0604020202020204" pitchFamily="34" charset="0"/>
+              </a:rPr>
+              <a:t>Die Verweilzeit pro Location wird von den Nutzern als tendenziell unwichtige Einstellungsmöglichkeit angesehen. (</a:t>
+            </a:r>
+            <a:r>
+              <a:rPr lang="de-DE" sz="1600" dirty="0" smtClean="0">
+                <a:latin typeface="Arial" panose="020B0604020202020204" pitchFamily="34" charset="0"/>
+                <a:cs typeface="Arial" panose="020B0604020202020204" pitchFamily="34" charset="0"/>
+                <a:hlinkClick r:id="rId5" action="ppaction://hlinksldjump"/>
+              </a:rPr>
+              <a:t>Folie 13</a:t>
+            </a:r>
+            <a:r>
+              <a:rPr lang="de-DE" sz="1600" dirty="0" smtClean="0">
+                <a:latin typeface="Arial" panose="020B0604020202020204" pitchFamily="34" charset="0"/>
+                <a:cs typeface="Arial" panose="020B0604020202020204" pitchFamily="34" charset="0"/>
+              </a:rPr>
+              <a:t>)</a:t>
+            </a:r>
+          </a:p>
+          <a:p>
+            <a:pPr>
+              <a:spcBef>
+                <a:spcPts val="0"/>
+              </a:spcBef>
+              <a:defRPr/>
+            </a:pPr>
+            <a:r>
+              <a:rPr lang="de-DE" sz="1600" dirty="0" smtClean="0">
+                <a:latin typeface="Arial" panose="020B0604020202020204" pitchFamily="34" charset="0"/>
+                <a:cs typeface="Arial" panose="020B0604020202020204" pitchFamily="34" charset="0"/>
+              </a:rPr>
+              <a:t>Gesamt bewertet sind über 84% der Teilnehmer mit den Einstellungsmöglichkeiten zufrieden. (</a:t>
+            </a:r>
+            <a:r>
+              <a:rPr lang="de-DE" sz="1600" dirty="0" smtClean="0">
+                <a:latin typeface="Arial" panose="020B0604020202020204" pitchFamily="34" charset="0"/>
+                <a:cs typeface="Arial" panose="020B0604020202020204" pitchFamily="34" charset="0"/>
+                <a:hlinkClick r:id="rId6" action="ppaction://hlinksldjump"/>
+              </a:rPr>
+              <a:t>Folie 14</a:t>
+            </a:r>
+            <a:r>
+              <a:rPr lang="de-DE" sz="1600" dirty="0" smtClean="0">
+                <a:latin typeface="Arial" panose="020B0604020202020204" pitchFamily="34" charset="0"/>
+                <a:cs typeface="Arial" panose="020B0604020202020204" pitchFamily="34" charset="0"/>
+              </a:rPr>
+              <a:t>)</a:t>
+            </a:r>
+          </a:p>
+          <a:p>
+            <a:pPr>
+              <a:spcBef>
+                <a:spcPts val="0"/>
+              </a:spcBef>
+              <a:defRPr/>
+            </a:pPr>
+            <a:r>
+              <a:rPr lang="de-DE" sz="1600" dirty="0" smtClean="0">
+                <a:latin typeface="Arial" panose="020B0604020202020204" pitchFamily="34" charset="0"/>
+                <a:cs typeface="Arial" panose="020B0604020202020204" pitchFamily="34" charset="0"/>
+              </a:rPr>
+              <a:t>Es wurden jedoch auch Vorschläge eingebracht, welche Einstellungsmöglichkeiten aus Sicht der Teilnehmer fehlen. Vor </a:t>
+            </a:r>
+            <a:r>
+              <a:rPr lang="de-DE" sz="1600" dirty="0">
+                <a:latin typeface="Arial" panose="020B0604020202020204" pitchFamily="34" charset="0"/>
+                <a:cs typeface="Arial" panose="020B0604020202020204" pitchFamily="34" charset="0"/>
+              </a:rPr>
+              <a:t>allem wurden genannt, die Einstellungsmöglichkeit des Preisniveaus, sowie der Essensmöglichkeiten</a:t>
+            </a:r>
+            <a:r>
+              <a:rPr lang="de-DE" sz="1600" dirty="0" smtClean="0">
+                <a:latin typeface="Arial" panose="020B0604020202020204" pitchFamily="34" charset="0"/>
+                <a:cs typeface="Arial" panose="020B0604020202020204" pitchFamily="34" charset="0"/>
+              </a:rPr>
+              <a:t>. (</a:t>
+            </a:r>
+            <a:r>
+              <a:rPr lang="de-DE" sz="1600" dirty="0" smtClean="0">
+                <a:latin typeface="Arial" panose="020B0604020202020204" pitchFamily="34" charset="0"/>
+                <a:cs typeface="Arial" panose="020B0604020202020204" pitchFamily="34" charset="0"/>
+                <a:hlinkClick r:id="rId7" action="ppaction://hlinksldjump"/>
+              </a:rPr>
+              <a:t>Folie 15</a:t>
+            </a:r>
+            <a:r>
+              <a:rPr lang="de-DE" sz="1600" dirty="0" smtClean="0">
+                <a:latin typeface="Arial" panose="020B0604020202020204" pitchFamily="34" charset="0"/>
+                <a:cs typeface="Arial" panose="020B0604020202020204" pitchFamily="34" charset="0"/>
+              </a:rPr>
+              <a:t>)</a:t>
+            </a:r>
+          </a:p>
+          <a:p>
+            <a:pPr>
+              <a:spcBef>
+                <a:spcPts val="0"/>
+              </a:spcBef>
+              <a:defRPr/>
+            </a:pPr>
+            <a:r>
+              <a:rPr lang="de-DE" sz="1600" dirty="0" smtClean="0">
+                <a:latin typeface="Arial" panose="020B0604020202020204" pitchFamily="34" charset="0"/>
+                <a:cs typeface="Arial" panose="020B0604020202020204" pitchFamily="34" charset="0"/>
+              </a:rPr>
+              <a:t>In Bezug auf die Funktionen schätzen die Teilnehmer vor allem das Erstellen eigener Routen, die Offlinenutzung eigener Routen sowie die Nutzung von vordefinierten Routen als wichtig bis sehr wichtig ein. (</a:t>
+            </a:r>
+            <a:r>
+              <a:rPr lang="de-DE" sz="1600" dirty="0" smtClean="0">
+                <a:latin typeface="Arial" panose="020B0604020202020204" pitchFamily="34" charset="0"/>
+                <a:cs typeface="Arial" panose="020B0604020202020204" pitchFamily="34" charset="0"/>
+                <a:hlinkClick r:id="rId8" action="ppaction://hlinksldjump"/>
+              </a:rPr>
+              <a:t>Folie 16 </a:t>
+            </a:r>
+            <a:r>
+              <a:rPr lang="de-DE" sz="1600" dirty="0" smtClean="0">
+                <a:latin typeface="Arial" panose="020B0604020202020204" pitchFamily="34" charset="0"/>
+                <a:cs typeface="Arial" panose="020B0604020202020204" pitchFamily="34" charset="0"/>
+              </a:rPr>
+              <a:t>&amp; </a:t>
+            </a:r>
+            <a:r>
+              <a:rPr lang="de-DE" sz="1600" dirty="0" smtClean="0">
+                <a:latin typeface="Arial" panose="020B0604020202020204" pitchFamily="34" charset="0"/>
+                <a:cs typeface="Arial" panose="020B0604020202020204" pitchFamily="34" charset="0"/>
+                <a:hlinkClick r:id="rId9" action="ppaction://hlinksldjump"/>
+              </a:rPr>
+              <a:t>Folie 17</a:t>
+            </a:r>
+            <a:r>
+              <a:rPr lang="de-DE" sz="1600" dirty="0" smtClean="0">
+                <a:latin typeface="Arial" panose="020B0604020202020204" pitchFamily="34" charset="0"/>
+                <a:cs typeface="Arial" panose="020B0604020202020204" pitchFamily="34" charset="0"/>
+              </a:rPr>
+              <a:t>)</a:t>
+            </a:r>
+          </a:p>
+          <a:p>
+            <a:pPr>
+              <a:spcBef>
+                <a:spcPts val="0"/>
+              </a:spcBef>
+              <a:defRPr/>
+            </a:pPr>
+            <a:r>
+              <a:rPr lang="de-DE" sz="1600" dirty="0" smtClean="0">
+                <a:latin typeface="Arial" panose="020B0604020202020204" pitchFamily="34" charset="0"/>
+                <a:cs typeface="Arial" panose="020B0604020202020204" pitchFamily="34" charset="0"/>
+              </a:rPr>
+              <a:t>Das Teilen einer eigenen Route mit Freunden ist deutlich schwächer ausgeprägt und liegt eher in der Mitte. (</a:t>
+            </a:r>
+            <a:r>
+              <a:rPr lang="de-DE" sz="1600" dirty="0" smtClean="0">
+                <a:latin typeface="Arial" panose="020B0604020202020204" pitchFamily="34" charset="0"/>
+                <a:cs typeface="Arial" panose="020B0604020202020204" pitchFamily="34" charset="0"/>
+                <a:hlinkClick r:id="rId9" action="ppaction://hlinksldjump"/>
+              </a:rPr>
+              <a:t>Folie 17</a:t>
+            </a:r>
+            <a:r>
+              <a:rPr lang="de-DE" sz="1600" dirty="0" smtClean="0">
+                <a:latin typeface="Arial" panose="020B0604020202020204" pitchFamily="34" charset="0"/>
+                <a:cs typeface="Arial" panose="020B0604020202020204" pitchFamily="34" charset="0"/>
+              </a:rPr>
+              <a:t>)</a:t>
+            </a:r>
+          </a:p>
+          <a:p>
+            <a:pPr>
+              <a:spcBef>
+                <a:spcPts val="0"/>
+              </a:spcBef>
+              <a:defRPr/>
+            </a:pPr>
+            <a:r>
+              <a:rPr lang="de-DE" sz="1600" dirty="0" smtClean="0">
+                <a:latin typeface="Arial" panose="020B0604020202020204" pitchFamily="34" charset="0"/>
+                <a:cs typeface="Arial" panose="020B0604020202020204" pitchFamily="34" charset="0"/>
+              </a:rPr>
+              <a:t>61,4</a:t>
+            </a:r>
+            <a:r>
+              <a:rPr lang="de-DE" sz="1600" dirty="0">
+                <a:latin typeface="Arial" panose="020B0604020202020204" pitchFamily="34" charset="0"/>
+                <a:cs typeface="Arial" panose="020B0604020202020204" pitchFamily="34" charset="0"/>
+              </a:rPr>
+              <a:t>% der Teilnehmer geben an, dass ihnen ein Link zum kopieren und verschicken am wichtigsten </a:t>
+            </a:r>
+            <a:r>
+              <a:rPr lang="de-DE" sz="1600" dirty="0" smtClean="0">
+                <a:latin typeface="Arial" panose="020B0604020202020204" pitchFamily="34" charset="0"/>
+                <a:cs typeface="Arial" panose="020B0604020202020204" pitchFamily="34" charset="0"/>
+              </a:rPr>
+              <a:t>ist, was die geplante Funktionalität, der Erzeugung eines Links entspricht. (</a:t>
+            </a:r>
+            <a:r>
+              <a:rPr lang="de-DE" sz="1600" dirty="0" smtClean="0">
+                <a:latin typeface="Arial" panose="020B0604020202020204" pitchFamily="34" charset="0"/>
+                <a:cs typeface="Arial" panose="020B0604020202020204" pitchFamily="34" charset="0"/>
+                <a:hlinkClick r:id="rId10" action="ppaction://hlinksldjump"/>
+              </a:rPr>
+              <a:t>Folie 18</a:t>
+            </a:r>
+            <a:r>
+              <a:rPr lang="de-DE" sz="1600" dirty="0" smtClean="0">
+                <a:latin typeface="Arial" panose="020B0604020202020204" pitchFamily="34" charset="0"/>
+                <a:cs typeface="Arial" panose="020B0604020202020204" pitchFamily="34" charset="0"/>
+              </a:rPr>
+              <a:t>)</a:t>
+            </a:r>
+            <a:endParaRPr lang="de-DE" sz="1600" dirty="0">
+              <a:latin typeface="Arial" panose="020B0604020202020204" pitchFamily="34" charset="0"/>
+              <a:cs typeface="Arial" panose="020B0604020202020204" pitchFamily="34" charset="0"/>
+            </a:endParaRPr>
+          </a:p>
+          <a:p>
+            <a:pPr>
+              <a:spcBef>
+                <a:spcPts val="0"/>
+              </a:spcBef>
+              <a:defRPr/>
+            </a:pPr>
+            <a:endParaRPr lang="de-DE" sz="1600" dirty="0">
+              <a:latin typeface="Arial" panose="020B0604020202020204" pitchFamily="34" charset="0"/>
+              <a:cs typeface="Arial" panose="020B0604020202020204" pitchFamily="34" charset="0"/>
+            </a:endParaRPr>
+          </a:p>
+          <a:p>
+            <a:pPr>
+              <a:spcBef>
+                <a:spcPts val="0"/>
+              </a:spcBef>
+              <a:defRPr/>
+            </a:pPr>
+            <a:endParaRPr lang="de-DE" sz="1600" dirty="0">
+              <a:latin typeface="Arial" panose="020B0604020202020204" pitchFamily="34" charset="0"/>
+              <a:cs typeface="Arial" panose="020B0604020202020204" pitchFamily="34" charset="0"/>
+            </a:endParaRPr>
+          </a:p>
+          <a:p>
+            <a:pPr>
+              <a:spcBef>
+                <a:spcPts val="0"/>
+              </a:spcBef>
+              <a:defRPr/>
+            </a:pPr>
+            <a:endParaRPr lang="de-DE" sz="1600" dirty="0" smtClean="0">
+              <a:latin typeface="Arial" panose="020B0604020202020204" pitchFamily="34" charset="0"/>
+              <a:cs typeface="Arial" panose="020B0604020202020204" pitchFamily="34" charset="0"/>
+            </a:endParaRPr>
+          </a:p>
+          <a:p>
+            <a:pPr>
+              <a:spcBef>
+                <a:spcPts val="0"/>
+              </a:spcBef>
+              <a:defRPr/>
+            </a:pPr>
+            <a:endParaRPr lang="de-DE" sz="1600" dirty="0" smtClean="0">
+              <a:latin typeface="Arial" panose="020B0604020202020204" pitchFamily="34" charset="0"/>
+              <a:cs typeface="Arial" panose="020B0604020202020204" pitchFamily="34" charset="0"/>
+            </a:endParaRPr>
           </a:p>
           <a:p>
             <a:pPr>
@@ -26511,286 +26981,451 @@
           <a:chExt cx="0" cy="0"/>
         </a:xfrm>
       </p:grpSpPr>
-      <p:graphicFrame>
-        <p:nvGraphicFramePr>
-          <p:cNvPr id="4" name="Inhaltsplatzhalter 3"/>
-          <p:cNvGraphicFramePr>
-            <a:graphicFrameLocks noGrp="1"/>
-          </p:cNvGraphicFramePr>
+      <p:sp>
+        <p:nvSpPr>
+          <p:cNvPr id="3" name="Inhaltsplatzhalter 2"/>
+          <p:cNvSpPr>
+            <a:spLocks noGrp="1"/>
+          </p:cNvSpPr>
           <p:nvPr>
             <p:ph idx="1"/>
-            <p:extLst>
-              <p:ext uri="{D42A27DB-BD31-4B8C-83A1-F6EECF244321}">
-                <p14:modId xmlns:p14="http://schemas.microsoft.com/office/powerpoint/2010/main" val="1733307478"/>
-              </p:ext>
-            </p:extLst>
           </p:nvPr>
-        </p:nvGraphicFramePr>
-        <p:xfrm>
-          <a:off x="251520" y="1196752"/>
-          <a:ext cx="8568952" cy="5256582"/>
-        </p:xfrm>
-        <a:graphic>
-          <a:graphicData uri="http://schemas.openxmlformats.org/drawingml/2006/table">
-            <a:tbl>
-              <a:tblPr firstRow="1" bandRow="1">
-                <a:tableStyleId>{5C22544A-7EE6-4342-B048-85BDC9FD1C3A}</a:tableStyleId>
-              </a:tblPr>
-              <a:tblGrid>
-                <a:gridCol w="1885202"/>
-                <a:gridCol w="6683750"/>
-              </a:tblGrid>
-              <a:tr h="338362">
-                <a:tc>
-                  <a:txBody>
-                    <a:bodyPr/>
-                    <a:lstStyle/>
-                    <a:p>
-                      <a:r>
-                        <a:rPr lang="de-DE" sz="1600" dirty="0" smtClean="0">
-                          <a:latin typeface="Arial" panose="020B0604020202020204" pitchFamily="34" charset="0"/>
-                          <a:cs typeface="Arial" panose="020B0604020202020204" pitchFamily="34" charset="0"/>
-                        </a:rPr>
-                        <a:t>Team</a:t>
-                      </a:r>
-                      <a:endParaRPr lang="de-DE" sz="1600" dirty="0">
-                        <a:latin typeface="Arial" panose="020B0604020202020204" pitchFamily="34" charset="0"/>
-                        <a:cs typeface="Arial" panose="020B0604020202020204" pitchFamily="34" charset="0"/>
-                      </a:endParaRPr>
-                    </a:p>
-                  </a:txBody>
-                  <a:tcPr>
-                    <a:solidFill>
-                      <a:srgbClr val="3F51B5"/>
-                    </a:solidFill>
-                  </a:tcPr>
-                </a:tc>
-                <a:tc>
-                  <a:txBody>
-                    <a:bodyPr/>
-                    <a:lstStyle/>
-                    <a:p>
-                      <a:r>
-                        <a:rPr lang="de-DE" sz="1600" dirty="0" smtClean="0">
-                          <a:latin typeface="Arial" panose="020B0604020202020204" pitchFamily="34" charset="0"/>
-                          <a:cs typeface="Arial" panose="020B0604020202020204" pitchFamily="34" charset="0"/>
-                        </a:rPr>
-                        <a:t>Kommentar</a:t>
-                      </a:r>
-                      <a:endParaRPr lang="de-DE" sz="1600" dirty="0">
-                        <a:latin typeface="Arial" panose="020B0604020202020204" pitchFamily="34" charset="0"/>
-                        <a:cs typeface="Arial" panose="020B0604020202020204" pitchFamily="34" charset="0"/>
-                      </a:endParaRPr>
-                    </a:p>
-                  </a:txBody>
-                  <a:tcPr>
-                    <a:solidFill>
-                      <a:srgbClr val="3F51B5"/>
-                    </a:solidFill>
-                  </a:tcPr>
-                </a:tc>
-              </a:tr>
-              <a:tr h="1075308">
-                <a:tc>
-                  <a:txBody>
-                    <a:bodyPr/>
-                    <a:lstStyle/>
-                    <a:p>
-                      <a:r>
-                        <a:rPr lang="de-DE" sz="1600" dirty="0" smtClean="0">
-                          <a:latin typeface="Arial" panose="020B0604020202020204" pitchFamily="34" charset="0"/>
-                          <a:cs typeface="Arial" panose="020B0604020202020204" pitchFamily="34" charset="0"/>
-                        </a:rPr>
-                        <a:t>Marketing</a:t>
-                      </a:r>
-                      <a:endParaRPr lang="de-DE" sz="1600" dirty="0">
-                        <a:latin typeface="Arial" panose="020B0604020202020204" pitchFamily="34" charset="0"/>
-                        <a:cs typeface="Arial" panose="020B0604020202020204" pitchFamily="34" charset="0"/>
-                      </a:endParaRPr>
-                    </a:p>
-                  </a:txBody>
-                  <a:tcPr/>
-                </a:tc>
-                <a:tc>
-                  <a:txBody>
-                    <a:bodyPr/>
-                    <a:lstStyle/>
-                    <a:p>
-                      <a:pPr marL="285750" marR="0" indent="-285750" algn="l" defTabSz="914400" rtl="0" eaLnBrk="1" fontAlgn="auto" latinLnBrk="0" hangingPunct="1">
-                        <a:lnSpc>
-                          <a:spcPct val="100000"/>
-                        </a:lnSpc>
-                        <a:spcBef>
-                          <a:spcPts val="0"/>
-                        </a:spcBef>
-                        <a:spcAft>
-                          <a:spcPts val="0"/>
-                        </a:spcAft>
-                        <a:buClrTx/>
-                        <a:buSzTx/>
-                        <a:buFont typeface="Arial" panose="020B0604020202020204" pitchFamily="34" charset="0"/>
-                        <a:buChar char="•"/>
-                        <a:tabLst/>
-                        <a:defRPr/>
-                      </a:pPr>
-                      <a:r>
-                        <a:rPr lang="de-DE" sz="1600" dirty="0" smtClean="0">
-                          <a:latin typeface="Arial" panose="020B0604020202020204" pitchFamily="34" charset="0"/>
-                          <a:cs typeface="Arial" panose="020B0604020202020204" pitchFamily="34" charset="0"/>
-                        </a:rPr>
-                        <a:t>??</a:t>
-                      </a:r>
-                      <a:endParaRPr lang="de-DE" sz="1600" dirty="0">
-                        <a:latin typeface="Arial" panose="020B0604020202020204" pitchFamily="34" charset="0"/>
-                        <a:cs typeface="Arial" panose="020B0604020202020204" pitchFamily="34" charset="0"/>
-                      </a:endParaRPr>
-                    </a:p>
-                  </a:txBody>
-                  <a:tcPr/>
-                </a:tc>
-              </a:tr>
-              <a:tr h="1360626">
-                <a:tc>
-                  <a:txBody>
-                    <a:bodyPr/>
-                    <a:lstStyle/>
-                    <a:p>
-                      <a:r>
-                        <a:rPr lang="de-DE" sz="1600" dirty="0" smtClean="0">
-                          <a:latin typeface="Arial" panose="020B0604020202020204" pitchFamily="34" charset="0"/>
-                          <a:cs typeface="Arial" panose="020B0604020202020204" pitchFamily="34" charset="0"/>
-                        </a:rPr>
-                        <a:t>Frontend</a:t>
-                      </a:r>
-                      <a:endParaRPr lang="de-DE" sz="1600" dirty="0">
-                        <a:latin typeface="Arial" panose="020B0604020202020204" pitchFamily="34" charset="0"/>
-                        <a:cs typeface="Arial" panose="020B0604020202020204" pitchFamily="34" charset="0"/>
-                      </a:endParaRPr>
-                    </a:p>
-                  </a:txBody>
-                  <a:tcPr/>
-                </a:tc>
-                <a:tc>
-                  <a:txBody>
-                    <a:bodyPr/>
-                    <a:lstStyle/>
-                    <a:p>
-                      <a:pPr marL="285750" indent="-285750">
-                        <a:buFont typeface="Arial" panose="020B0604020202020204" pitchFamily="34" charset="0"/>
-                        <a:buChar char="•"/>
-                      </a:pPr>
-                      <a:r>
-                        <a:rPr lang="de-DE" sz="1600" dirty="0" smtClean="0">
-                          <a:latin typeface="Arial" panose="020B0604020202020204" pitchFamily="34" charset="0"/>
-                          <a:cs typeface="Arial" panose="020B0604020202020204" pitchFamily="34" charset="0"/>
-                        </a:rPr>
-                        <a:t>??</a:t>
-                      </a:r>
-                      <a:endParaRPr lang="de-DE" sz="1600" dirty="0">
-                        <a:latin typeface="Arial" panose="020B0604020202020204" pitchFamily="34" charset="0"/>
-                        <a:cs typeface="Arial" panose="020B0604020202020204" pitchFamily="34" charset="0"/>
-                      </a:endParaRPr>
-                    </a:p>
-                  </a:txBody>
-                  <a:tcPr/>
-                </a:tc>
-              </a:tr>
-              <a:tr h="1571604">
-                <a:tc>
-                  <a:txBody>
-                    <a:bodyPr/>
-                    <a:lstStyle/>
-                    <a:p>
-                      <a:r>
-                        <a:rPr lang="de-DE" sz="1600" dirty="0" smtClean="0">
-                          <a:latin typeface="Arial" panose="020B0604020202020204" pitchFamily="34" charset="0"/>
-                          <a:cs typeface="Arial" panose="020B0604020202020204" pitchFamily="34" charset="0"/>
-                        </a:rPr>
-                        <a:t>Design</a:t>
-                      </a:r>
-                      <a:endParaRPr lang="de-DE" sz="1600" dirty="0">
-                        <a:latin typeface="Arial" panose="020B0604020202020204" pitchFamily="34" charset="0"/>
-                        <a:cs typeface="Arial" panose="020B0604020202020204" pitchFamily="34" charset="0"/>
-                      </a:endParaRPr>
-                    </a:p>
-                  </a:txBody>
-                  <a:tcPr/>
-                </a:tc>
-                <a:tc>
-                  <a:txBody>
-                    <a:bodyPr/>
-                    <a:lstStyle/>
-                    <a:p>
-                      <a:pPr marL="285750" indent="-285750">
-                        <a:buFont typeface="Arial" panose="020B0604020202020204" pitchFamily="34" charset="0"/>
-                        <a:buChar char="•"/>
-                      </a:pPr>
-                      <a:r>
-                        <a:rPr lang="de-DE" sz="1600" dirty="0" smtClean="0">
-                          <a:latin typeface="Arial" panose="020B0604020202020204" pitchFamily="34" charset="0"/>
-                          <a:cs typeface="Arial" panose="020B0604020202020204" pitchFamily="34" charset="0"/>
-                        </a:rPr>
-                        <a:t>??</a:t>
-                      </a:r>
-                      <a:endParaRPr lang="de-DE" sz="1600" dirty="0">
-                        <a:latin typeface="Arial" panose="020B0604020202020204" pitchFamily="34" charset="0"/>
-                        <a:cs typeface="Arial" panose="020B0604020202020204" pitchFamily="34" charset="0"/>
-                      </a:endParaRPr>
-                    </a:p>
-                  </a:txBody>
-                  <a:tcPr/>
-                </a:tc>
-              </a:tr>
-              <a:tr h="910682">
-                <a:tc>
-                  <a:txBody>
-                    <a:bodyPr/>
-                    <a:lstStyle/>
-                    <a:p>
-                      <a:r>
-                        <a:rPr lang="de-DE" sz="1600" dirty="0" smtClean="0">
-                          <a:latin typeface="Arial" panose="020B0604020202020204" pitchFamily="34" charset="0"/>
-                          <a:cs typeface="Arial" panose="020B0604020202020204" pitchFamily="34" charset="0"/>
-                        </a:rPr>
-                        <a:t>Backend</a:t>
-                      </a:r>
-                      <a:endParaRPr lang="de-DE" sz="1600" dirty="0">
-                        <a:latin typeface="Arial" panose="020B0604020202020204" pitchFamily="34" charset="0"/>
-                        <a:cs typeface="Arial" panose="020B0604020202020204" pitchFamily="34" charset="0"/>
-                      </a:endParaRPr>
-                    </a:p>
-                  </a:txBody>
-                  <a:tcPr/>
-                </a:tc>
-                <a:tc>
-                  <a:txBody>
-                    <a:bodyPr/>
-                    <a:lstStyle/>
-                    <a:p>
-                      <a:pPr marL="285750" indent="-285750">
-                        <a:buFont typeface="Arial" panose="020B0604020202020204" pitchFamily="34" charset="0"/>
-                        <a:buChar char="•"/>
-                      </a:pPr>
-                      <a:r>
-                        <a:rPr lang="de-DE" sz="1600" dirty="0" smtClean="0">
-                          <a:latin typeface="Arial" panose="020B0604020202020204" pitchFamily="34" charset="0"/>
-                          <a:cs typeface="Arial" panose="020B0604020202020204" pitchFamily="34" charset="0"/>
-                        </a:rPr>
-                        <a:t>??</a:t>
-                      </a:r>
-                      <a:endParaRPr lang="de-DE" sz="1600" dirty="0">
-                        <a:latin typeface="Arial" panose="020B0604020202020204" pitchFamily="34" charset="0"/>
-                        <a:cs typeface="Arial" panose="020B0604020202020204" pitchFamily="34" charset="0"/>
-                      </a:endParaRPr>
-                    </a:p>
-                  </a:txBody>
-                  <a:tcPr/>
-                </a:tc>
-              </a:tr>
-            </a:tbl>
-          </a:graphicData>
-        </a:graphic>
-      </p:graphicFrame>
+        </p:nvSpPr>
+        <p:spPr>
+          <a:xfrm>
+            <a:off x="457200" y="1268760"/>
+            <a:ext cx="8229600" cy="5184576"/>
+          </a:xfrm>
+        </p:spPr>
+        <p:txBody>
+          <a:bodyPr>
+            <a:normAutofit lnSpcReduction="10000"/>
+          </a:bodyPr>
+          <a:lstStyle/>
+          <a:p>
+            <a:pPr>
+              <a:spcBef>
+                <a:spcPts val="0"/>
+              </a:spcBef>
+              <a:defRPr/>
+            </a:pPr>
+            <a:r>
+              <a:rPr lang="de-DE" sz="1600" dirty="0" smtClean="0">
+                <a:latin typeface="Arial" panose="020B0604020202020204" pitchFamily="34" charset="0"/>
+                <a:cs typeface="Arial" panose="020B0604020202020204" pitchFamily="34" charset="0"/>
+              </a:rPr>
+              <a:t>Über 90% der Teilnehmer geben an, dass ihnen ein neuer Routenvorschlag pro Tag ausreicht. Die Teilnehmer die angegeben haben, dass ihnen ein Vorschlag nicht ausreicht geben im Durchschnitt an, dass drei Routenvorschläge pro Tag optimal wären. (</a:t>
+            </a:r>
+            <a:r>
+              <a:rPr lang="de-DE" sz="1600" dirty="0" smtClean="0">
+                <a:latin typeface="Arial" panose="020B0604020202020204" pitchFamily="34" charset="0"/>
+                <a:cs typeface="Arial" panose="020B0604020202020204" pitchFamily="34" charset="0"/>
+                <a:hlinkClick r:id="rId2" action="ppaction://hlinksldjump"/>
+              </a:rPr>
+              <a:t>Folie 19</a:t>
+            </a:r>
+            <a:r>
+              <a:rPr lang="de-DE" sz="1600" dirty="0" smtClean="0">
+                <a:latin typeface="Arial" panose="020B0604020202020204" pitchFamily="34" charset="0"/>
+                <a:cs typeface="Arial" panose="020B0604020202020204" pitchFamily="34" charset="0"/>
+              </a:rPr>
+              <a:t>)</a:t>
+            </a:r>
+          </a:p>
+          <a:p>
+            <a:pPr>
+              <a:spcBef>
+                <a:spcPts val="0"/>
+              </a:spcBef>
+              <a:defRPr/>
+            </a:pPr>
+            <a:r>
+              <a:rPr lang="de-DE" sz="1600" dirty="0" smtClean="0">
+                <a:latin typeface="Arial" panose="020B0604020202020204" pitchFamily="34" charset="0"/>
+                <a:cs typeface="Arial" panose="020B0604020202020204" pitchFamily="34" charset="0"/>
+              </a:rPr>
+              <a:t>Das abspeichern von selbst erstellten Routen wird als Funktion auf jeden Fall erwartet. (</a:t>
+            </a:r>
+            <a:r>
+              <a:rPr lang="de-DE" sz="1600" dirty="0" smtClean="0">
+                <a:latin typeface="Arial" panose="020B0604020202020204" pitchFamily="34" charset="0"/>
+                <a:cs typeface="Arial" panose="020B0604020202020204" pitchFamily="34" charset="0"/>
+                <a:hlinkClick r:id="rId3" action="ppaction://hlinksldjump"/>
+              </a:rPr>
+              <a:t>Folie 20</a:t>
+            </a:r>
+            <a:r>
+              <a:rPr lang="de-DE" sz="1600" dirty="0" smtClean="0">
+                <a:latin typeface="Arial" panose="020B0604020202020204" pitchFamily="34" charset="0"/>
+                <a:cs typeface="Arial" panose="020B0604020202020204" pitchFamily="34" charset="0"/>
+              </a:rPr>
+              <a:t>)</a:t>
+            </a:r>
+          </a:p>
+          <a:p>
+            <a:pPr>
+              <a:spcBef>
+                <a:spcPts val="0"/>
+              </a:spcBef>
+              <a:defRPr/>
+            </a:pPr>
+            <a:r>
+              <a:rPr lang="de-DE" sz="1600" dirty="0" smtClean="0">
+                <a:latin typeface="Arial" panose="020B0604020202020204" pitchFamily="34" charset="0"/>
+                <a:cs typeface="Arial" panose="020B0604020202020204" pitchFamily="34" charset="0"/>
+              </a:rPr>
+              <a:t>Eine Kontaktaufnahmefunktion mit dem Entwickler wünschen sich mehr als 60% der Teilnehmer, ist aber nicht zwangsläufig notwendig. (</a:t>
+            </a:r>
+            <a:r>
+              <a:rPr lang="de-DE" sz="1600" dirty="0" smtClean="0">
+                <a:latin typeface="Arial" panose="020B0604020202020204" pitchFamily="34" charset="0"/>
+                <a:cs typeface="Arial" panose="020B0604020202020204" pitchFamily="34" charset="0"/>
+                <a:hlinkClick r:id="rId4" action="ppaction://hlinksldjump"/>
+              </a:rPr>
+              <a:t>Folie 21</a:t>
+            </a:r>
+            <a:r>
+              <a:rPr lang="de-DE" sz="1600" dirty="0" smtClean="0">
+                <a:latin typeface="Arial" panose="020B0604020202020204" pitchFamily="34" charset="0"/>
+                <a:cs typeface="Arial" panose="020B0604020202020204" pitchFamily="34" charset="0"/>
+              </a:rPr>
+              <a:t>)</a:t>
+            </a:r>
+          </a:p>
+          <a:p>
+            <a:pPr>
+              <a:spcBef>
+                <a:spcPts val="0"/>
+              </a:spcBef>
+              <a:defRPr/>
+            </a:pPr>
+            <a:r>
+              <a:rPr lang="de-DE" sz="1600" dirty="0" smtClean="0">
+                <a:latin typeface="Arial" panose="020B0604020202020204" pitchFamily="34" charset="0"/>
+                <a:cs typeface="Arial" panose="020B0604020202020204" pitchFamily="34" charset="0"/>
+              </a:rPr>
+              <a:t>Mehr als 75% der Teilnehmer gaben an, dass sie ihre Route lieber am Handy erstellen wollen. (</a:t>
+            </a:r>
+            <a:r>
+              <a:rPr lang="de-DE" sz="1600" dirty="0" smtClean="0">
+                <a:latin typeface="Arial" panose="020B0604020202020204" pitchFamily="34" charset="0"/>
+                <a:cs typeface="Arial" panose="020B0604020202020204" pitchFamily="34" charset="0"/>
+                <a:hlinkClick r:id="rId5" action="ppaction://hlinksldjump"/>
+              </a:rPr>
+              <a:t>Folie 22</a:t>
+            </a:r>
+            <a:r>
+              <a:rPr lang="de-DE" sz="1600" dirty="0" smtClean="0">
+                <a:latin typeface="Arial" panose="020B0604020202020204" pitchFamily="34" charset="0"/>
+                <a:cs typeface="Arial" panose="020B0604020202020204" pitchFamily="34" charset="0"/>
+              </a:rPr>
+              <a:t>)</a:t>
+            </a:r>
+          </a:p>
+          <a:p>
+            <a:pPr>
+              <a:spcBef>
+                <a:spcPts val="0"/>
+              </a:spcBef>
+              <a:defRPr/>
+            </a:pPr>
+            <a:r>
+              <a:rPr lang="de-DE" sz="1600" dirty="0" smtClean="0">
+                <a:latin typeface="Arial" panose="020B0604020202020204" pitchFamily="34" charset="0"/>
+                <a:cs typeface="Arial" panose="020B0604020202020204" pitchFamily="34" charset="0"/>
+              </a:rPr>
+              <a:t>Der größte Teil der Teilnehmer (87,2%) finden das Design der Startseite gut bzw. sehr gut. (</a:t>
+            </a:r>
+            <a:r>
+              <a:rPr lang="de-DE" sz="1600" dirty="0" smtClean="0">
+                <a:latin typeface="Arial" panose="020B0604020202020204" pitchFamily="34" charset="0"/>
+                <a:cs typeface="Arial" panose="020B0604020202020204" pitchFamily="34" charset="0"/>
+                <a:hlinkClick r:id="rId6" action="ppaction://hlinksldjump"/>
+              </a:rPr>
+              <a:t>Folie 24</a:t>
+            </a:r>
+            <a:r>
+              <a:rPr lang="de-DE" sz="1600" dirty="0" smtClean="0">
+                <a:latin typeface="Arial" panose="020B0604020202020204" pitchFamily="34" charset="0"/>
+                <a:cs typeface="Arial" panose="020B0604020202020204" pitchFamily="34" charset="0"/>
+              </a:rPr>
+              <a:t>)</a:t>
+            </a:r>
+          </a:p>
+          <a:p>
+            <a:pPr>
+              <a:spcBef>
+                <a:spcPts val="0"/>
+              </a:spcBef>
+              <a:defRPr/>
+            </a:pPr>
+            <a:r>
+              <a:rPr lang="de-DE" sz="1600" dirty="0" smtClean="0">
+                <a:latin typeface="Arial" panose="020B0604020202020204" pitchFamily="34" charset="0"/>
+                <a:cs typeface="Arial" panose="020B0604020202020204" pitchFamily="34" charset="0"/>
+              </a:rPr>
+              <a:t>Als Kritikpunkt wurde unter </a:t>
+            </a:r>
+            <a:r>
+              <a:rPr lang="de-DE" sz="1600" dirty="0">
+                <a:latin typeface="Arial" panose="020B0604020202020204" pitchFamily="34" charset="0"/>
+                <a:cs typeface="Arial" panose="020B0604020202020204" pitchFamily="34" charset="0"/>
+              </a:rPr>
+              <a:t>anderem </a:t>
+            </a:r>
+            <a:r>
+              <a:rPr lang="de-DE" sz="1600" dirty="0" smtClean="0">
+                <a:latin typeface="Arial" panose="020B0604020202020204" pitchFamily="34" charset="0"/>
+                <a:cs typeface="Arial" panose="020B0604020202020204" pitchFamily="34" charset="0"/>
+              </a:rPr>
+              <a:t>darauf </a:t>
+            </a:r>
+            <a:r>
+              <a:rPr lang="de-DE" sz="1600" dirty="0">
+                <a:latin typeface="Arial" panose="020B0604020202020204" pitchFamily="34" charset="0"/>
+                <a:cs typeface="Arial" panose="020B0604020202020204" pitchFamily="34" charset="0"/>
+              </a:rPr>
+              <a:t>hingewiesen, dass der Text auf dem Bildhintergrund sehr schwer zu lesen</a:t>
+            </a:r>
+            <a:r>
+              <a:rPr lang="de-DE" sz="1600" b="1" dirty="0">
+                <a:latin typeface="Arial" panose="020B0604020202020204" pitchFamily="34" charset="0"/>
+                <a:cs typeface="Arial" panose="020B0604020202020204" pitchFamily="34" charset="0"/>
+              </a:rPr>
+              <a:t> </a:t>
+            </a:r>
+            <a:r>
+              <a:rPr lang="de-DE" sz="1600" dirty="0">
+                <a:latin typeface="Arial" panose="020B0604020202020204" pitchFamily="34" charset="0"/>
+                <a:cs typeface="Arial" panose="020B0604020202020204" pitchFamily="34" charset="0"/>
+              </a:rPr>
+              <a:t>ist</a:t>
+            </a:r>
+            <a:r>
+              <a:rPr lang="de-DE" sz="1600" dirty="0" smtClean="0">
+                <a:latin typeface="Arial" panose="020B0604020202020204" pitchFamily="34" charset="0"/>
+                <a:cs typeface="Arial" panose="020B0604020202020204" pitchFamily="34" charset="0"/>
+              </a:rPr>
+              <a:t>. (</a:t>
+            </a:r>
+            <a:r>
+              <a:rPr lang="de-DE" sz="1600" dirty="0" smtClean="0">
+                <a:latin typeface="Arial" panose="020B0604020202020204" pitchFamily="34" charset="0"/>
+                <a:cs typeface="Arial" panose="020B0604020202020204" pitchFamily="34" charset="0"/>
+                <a:hlinkClick r:id="rId7" action="ppaction://hlinksldjump"/>
+              </a:rPr>
+              <a:t>Folie 25</a:t>
+            </a:r>
+            <a:r>
+              <a:rPr lang="de-DE" sz="1600" dirty="0" smtClean="0">
+                <a:latin typeface="Arial" panose="020B0604020202020204" pitchFamily="34" charset="0"/>
+                <a:cs typeface="Arial" panose="020B0604020202020204" pitchFamily="34" charset="0"/>
+              </a:rPr>
+              <a:t>)</a:t>
+            </a:r>
+          </a:p>
+          <a:p>
+            <a:pPr>
+              <a:spcBef>
+                <a:spcPts val="0"/>
+              </a:spcBef>
+              <a:defRPr/>
+            </a:pPr>
+            <a:r>
+              <a:rPr lang="de-DE" sz="1600" dirty="0">
+                <a:latin typeface="Arial" panose="020B0604020202020204" pitchFamily="34" charset="0"/>
+                <a:cs typeface="Arial" panose="020B0604020202020204" pitchFamily="34" charset="0"/>
+              </a:rPr>
+              <a:t>Der größte Teil der Teilnehmer (</a:t>
+            </a:r>
+            <a:r>
+              <a:rPr lang="de-DE" sz="1600" dirty="0" smtClean="0">
+                <a:latin typeface="Arial" panose="020B0604020202020204" pitchFamily="34" charset="0"/>
+                <a:cs typeface="Arial" panose="020B0604020202020204" pitchFamily="34" charset="0"/>
+              </a:rPr>
+              <a:t>85,7%) </a:t>
+            </a:r>
+            <a:r>
+              <a:rPr lang="de-DE" sz="1600" dirty="0">
+                <a:latin typeface="Arial" panose="020B0604020202020204" pitchFamily="34" charset="0"/>
+                <a:cs typeface="Arial" panose="020B0604020202020204" pitchFamily="34" charset="0"/>
+              </a:rPr>
+              <a:t>finden das Design der </a:t>
+            </a:r>
+            <a:r>
+              <a:rPr lang="de-DE" sz="1600" dirty="0" smtClean="0">
+                <a:latin typeface="Arial" panose="020B0604020202020204" pitchFamily="34" charset="0"/>
+                <a:cs typeface="Arial" panose="020B0604020202020204" pitchFamily="34" charset="0"/>
+              </a:rPr>
+              <a:t>Optionen </a:t>
+            </a:r>
+            <a:r>
+              <a:rPr lang="de-DE" sz="1600" dirty="0">
+                <a:latin typeface="Arial" panose="020B0604020202020204" pitchFamily="34" charset="0"/>
+                <a:cs typeface="Arial" panose="020B0604020202020204" pitchFamily="34" charset="0"/>
+              </a:rPr>
+              <a:t>gut bzw. sehr gut. (</a:t>
+            </a:r>
+            <a:r>
+              <a:rPr lang="de-DE" sz="1600" dirty="0" smtClean="0">
+                <a:latin typeface="Arial" panose="020B0604020202020204" pitchFamily="34" charset="0"/>
+                <a:cs typeface="Arial" panose="020B0604020202020204" pitchFamily="34" charset="0"/>
+                <a:hlinkClick r:id="rId8" action="ppaction://hlinksldjump"/>
+              </a:rPr>
+              <a:t>Folie 27</a:t>
+            </a:r>
+            <a:r>
+              <a:rPr lang="de-DE" sz="1600" dirty="0" smtClean="0">
+                <a:latin typeface="Arial" panose="020B0604020202020204" pitchFamily="34" charset="0"/>
+                <a:cs typeface="Arial" panose="020B0604020202020204" pitchFamily="34" charset="0"/>
+              </a:rPr>
+              <a:t>)</a:t>
+            </a:r>
+            <a:endParaRPr lang="de-DE" sz="1600" dirty="0">
+              <a:latin typeface="Arial" panose="020B0604020202020204" pitchFamily="34" charset="0"/>
+              <a:cs typeface="Arial" panose="020B0604020202020204" pitchFamily="34" charset="0"/>
+            </a:endParaRPr>
+          </a:p>
+          <a:p>
+            <a:pPr>
+              <a:spcBef>
+                <a:spcPts val="0"/>
+              </a:spcBef>
+              <a:defRPr/>
+            </a:pPr>
+            <a:r>
+              <a:rPr lang="de-DE" sz="1600" dirty="0">
+                <a:latin typeface="Arial" panose="020B0604020202020204" pitchFamily="34" charset="0"/>
+                <a:cs typeface="Arial" panose="020B0604020202020204" pitchFamily="34" charset="0"/>
+              </a:rPr>
+              <a:t>Als Kritikpunkt wurde unter anderem darauf hingewiesen, dass </a:t>
+            </a:r>
+            <a:r>
+              <a:rPr lang="de-DE" sz="1600" dirty="0" smtClean="0">
+                <a:latin typeface="Arial" panose="020B0604020202020204" pitchFamily="34" charset="0"/>
+                <a:cs typeface="Arial" panose="020B0604020202020204" pitchFamily="34" charset="0"/>
+              </a:rPr>
+              <a:t>die Einheiten </a:t>
+            </a:r>
+            <a:r>
+              <a:rPr lang="de-DE" sz="1600" dirty="0">
+                <a:latin typeface="Arial" panose="020B0604020202020204" pitchFamily="34" charset="0"/>
+                <a:cs typeface="Arial" panose="020B0604020202020204" pitchFamily="34" charset="0"/>
+              </a:rPr>
+              <a:t>bei den Einstellungsmöglichkeiten fehlen.</a:t>
+            </a:r>
+            <a:r>
+              <a:rPr lang="de-DE" sz="1600" dirty="0" smtClean="0">
+                <a:latin typeface="Arial" panose="020B0604020202020204" pitchFamily="34" charset="0"/>
+                <a:cs typeface="Arial" panose="020B0604020202020204" pitchFamily="34" charset="0"/>
+              </a:rPr>
+              <a:t> </a:t>
+            </a:r>
+            <a:r>
+              <a:rPr lang="de-DE" sz="1600" dirty="0">
+                <a:latin typeface="Arial" panose="020B0604020202020204" pitchFamily="34" charset="0"/>
+                <a:cs typeface="Arial" panose="020B0604020202020204" pitchFamily="34" charset="0"/>
+              </a:rPr>
+              <a:t>(</a:t>
+            </a:r>
+            <a:r>
+              <a:rPr lang="de-DE" sz="1600" dirty="0">
+                <a:latin typeface="Arial" panose="020B0604020202020204" pitchFamily="34" charset="0"/>
+                <a:cs typeface="Arial" panose="020B0604020202020204" pitchFamily="34" charset="0"/>
+                <a:hlinkClick r:id="rId9" action="ppaction://hlinksldjump"/>
+              </a:rPr>
+              <a:t>Folie </a:t>
+            </a:r>
+            <a:r>
+              <a:rPr lang="de-DE" sz="1600" dirty="0" smtClean="0">
+                <a:latin typeface="Arial" panose="020B0604020202020204" pitchFamily="34" charset="0"/>
+                <a:cs typeface="Arial" panose="020B0604020202020204" pitchFamily="34" charset="0"/>
+                <a:hlinkClick r:id="rId9" action="ppaction://hlinksldjump"/>
+              </a:rPr>
+              <a:t>28</a:t>
+            </a:r>
+            <a:r>
+              <a:rPr lang="de-DE" sz="1600" dirty="0" smtClean="0">
+                <a:latin typeface="Arial" panose="020B0604020202020204" pitchFamily="34" charset="0"/>
+                <a:cs typeface="Arial" panose="020B0604020202020204" pitchFamily="34" charset="0"/>
+              </a:rPr>
+              <a:t>)</a:t>
+            </a:r>
+          </a:p>
+          <a:p>
+            <a:pPr>
+              <a:spcBef>
+                <a:spcPts val="0"/>
+              </a:spcBef>
+              <a:defRPr/>
+            </a:pPr>
+            <a:r>
+              <a:rPr lang="de-DE" sz="1600" dirty="0" smtClean="0">
+                <a:latin typeface="Arial" panose="020B0604020202020204" pitchFamily="34" charset="0"/>
+                <a:cs typeface="Arial" panose="020B0604020202020204" pitchFamily="34" charset="0"/>
+              </a:rPr>
+              <a:t>In den allgemeinen Verbesserungsvorschlägen fanden sich viele Punkte, die auch schon zuvor genannte wurden, wie beispielsweise die schwere Lesbarkeit oder das Fehlen der Einheiten bei den Optionen (</a:t>
+            </a:r>
+            <a:r>
+              <a:rPr lang="de-DE" sz="1600" dirty="0" smtClean="0">
+                <a:latin typeface="Arial" panose="020B0604020202020204" pitchFamily="34" charset="0"/>
+                <a:cs typeface="Arial" panose="020B0604020202020204" pitchFamily="34" charset="0"/>
+                <a:hlinkClick r:id="rId10" action="ppaction://hlinksldjump"/>
+              </a:rPr>
+              <a:t>Folie 29 </a:t>
+            </a:r>
+            <a:r>
+              <a:rPr lang="de-DE" sz="1600" dirty="0" smtClean="0">
+                <a:latin typeface="Arial" panose="020B0604020202020204" pitchFamily="34" charset="0"/>
+                <a:cs typeface="Arial" panose="020B0604020202020204" pitchFamily="34" charset="0"/>
+              </a:rPr>
+              <a:t>&amp; </a:t>
+            </a:r>
+            <a:r>
+              <a:rPr lang="de-DE" sz="1600" dirty="0" smtClean="0">
+                <a:latin typeface="Arial" panose="020B0604020202020204" pitchFamily="34" charset="0"/>
+                <a:cs typeface="Arial" panose="020B0604020202020204" pitchFamily="34" charset="0"/>
+                <a:hlinkClick r:id="rId11" action="ppaction://hlinksldjump"/>
+              </a:rPr>
+              <a:t>Folie 30</a:t>
+            </a:r>
+            <a:r>
+              <a:rPr lang="de-DE" sz="1600" dirty="0" smtClean="0">
+                <a:latin typeface="Arial" panose="020B0604020202020204" pitchFamily="34" charset="0"/>
+                <a:cs typeface="Arial" panose="020B0604020202020204" pitchFamily="34" charset="0"/>
+              </a:rPr>
+              <a:t>)</a:t>
+            </a:r>
+            <a:endParaRPr lang="de-DE" sz="1600" dirty="0" smtClean="0">
+              <a:latin typeface="Arial" panose="020B0604020202020204" pitchFamily="34" charset="0"/>
+              <a:cs typeface="Arial" panose="020B0604020202020204" pitchFamily="34" charset="0"/>
+            </a:endParaRPr>
+          </a:p>
+        </p:txBody>
+      </p:sp>
+      <p:sp>
+        <p:nvSpPr>
+          <p:cNvPr id="4" name="Foliennummernplatzhalter 3"/>
+          <p:cNvSpPr>
+            <a:spLocks noGrp="1"/>
+          </p:cNvSpPr>
+          <p:nvPr>
+            <p:ph type="sldNum" sz="quarter" idx="12"/>
+          </p:nvPr>
+        </p:nvSpPr>
+        <p:spPr/>
+        <p:txBody>
+          <a:bodyPr/>
+          <a:lstStyle/>
+          <a:p>
+            <a:fld id="{6C6AE60A-B69C-4790-82F7-3882EDF23186}" type="slidenum">
+              <a:rPr lang="de-DE" smtClean="0"/>
+              <a:t>32</a:t>
+            </a:fld>
+            <a:endParaRPr lang="de-DE"/>
+          </a:p>
+        </p:txBody>
+      </p:sp>
       <p:sp>
         <p:nvSpPr>
           <p:cNvPr id="5" name="Titel 1"/>
@@ -26842,42 +27477,19 @@
                 <a:latin typeface="Arial" panose="020B0604020202020204" pitchFamily="34" charset="0"/>
                 <a:cs typeface="Arial" panose="020B0604020202020204" pitchFamily="34" charset="0"/>
               </a:rPr>
-              <a:t>– Teamübersicht</a:t>
+              <a:t>– Zusammenfassung</a:t>
             </a:r>
             <a:endParaRPr lang="de-DE" sz="2000" dirty="0">
               <a:latin typeface="Arial" panose="020B0604020202020204" pitchFamily="34" charset="0"/>
               <a:cs typeface="Arial" panose="020B0604020202020204" pitchFamily="34" charset="0"/>
             </a:endParaRPr>
-          </a:p>
-        </p:txBody>
-      </p:sp>
-      <p:sp>
-        <p:nvSpPr>
-          <p:cNvPr id="6" name="Foliennummernplatzhalter 5"/>
-          <p:cNvSpPr>
-            <a:spLocks noGrp="1"/>
-          </p:cNvSpPr>
-          <p:nvPr>
-            <p:ph type="sldNum" sz="quarter" idx="12"/>
-          </p:nvPr>
-        </p:nvSpPr>
-        <p:spPr/>
-        <p:txBody>
-          <a:bodyPr/>
-          <a:lstStyle/>
-          <a:p>
-            <a:fld id="{6C6AE60A-B69C-4790-82F7-3882EDF23186}" type="slidenum">
-              <a:rPr lang="de-DE" smtClean="0"/>
-              <a:t>32</a:t>
-            </a:fld>
-            <a:endParaRPr lang="de-DE"/>
           </a:p>
         </p:txBody>
       </p:sp>
     </p:spTree>
     <p:extLst>
       <p:ext uri="{BB962C8B-B14F-4D97-AF65-F5344CB8AC3E}">
-        <p14:creationId xmlns:p14="http://schemas.microsoft.com/office/powerpoint/2010/main" val="382308294"/>
+        <p14:creationId xmlns:p14="http://schemas.microsoft.com/office/powerpoint/2010/main" val="3058551958"/>
       </p:ext>
     </p:extLst>
   </p:cSld>

</xml_diff>